<commit_message>
handout für PM ist auch im Ordner
</commit_message>
<xml_diff>
--- a/01_Projektmanagement/Assignment 5 - Project Managements Methods.pptx
+++ b/01_Projektmanagement/Assignment 5 - Project Managements Methods.pptx
@@ -13,9 +13,9 @@
   <p:sldIdLst>
     <p:sldId id="256" r:id="rId2"/>
     <p:sldId id="1735" r:id="rId3"/>
-    <p:sldId id="1743" r:id="rId4"/>
-    <p:sldId id="1744" r:id="rId5"/>
-    <p:sldId id="1745" r:id="rId6"/>
+    <p:sldId id="1745" r:id="rId4"/>
+    <p:sldId id="1743" r:id="rId5"/>
+    <p:sldId id="1744" r:id="rId6"/>
     <p:sldId id="1746" r:id="rId7"/>
     <p:sldId id="1747" r:id="rId8"/>
     <p:sldId id="1748" r:id="rId9"/>
@@ -174,106 +174,12 @@
 </p:presentation>
 </file>
 
+<file path=ppt/revisionInfo.xml><?xml version="1.0" encoding="utf-8"?>
+<p1510:revInfo xmlns:a="http://schemas.openxmlformats.org/drawingml/2006/main" xmlns:r="http://schemas.openxmlformats.org/officeDocument/2006/relationships" xmlns:p1510="http://schemas.microsoft.com/office/powerpoint/2015/10/main"/>
+</file>
+
 <file path=ppt/changesInfos/changesInfo1.xml><?xml version="1.0" encoding="utf-8"?>
 <pc:chgInfo xmlns:a="http://schemas.openxmlformats.org/drawingml/2006/main" xmlns:r="http://schemas.openxmlformats.org/officeDocument/2006/relationships" xmlns:ac="http://schemas.microsoft.com/office/drawing/2013/main/command" xmlns:pc="http://schemas.microsoft.com/office/powerpoint/2013/main/command">
-  <pc:docChgLst>
-    <pc:chgData name="Chris G" userId="ec6dd0bf820af39d" providerId="LiveId" clId="{77B084DB-34BD-4714-AFF6-B98C98F6D19D}"/>
-    <pc:docChg chg="custSel addSld delSld modSld modMainMaster">
-      <pc:chgData name="Chris G" userId="ec6dd0bf820af39d" providerId="LiveId" clId="{77B084DB-34BD-4714-AFF6-B98C98F6D19D}" dt="2018-01-19T18:41:39.476" v="445" actId="20577"/>
-      <pc:docMkLst>
-        <pc:docMk/>
-      </pc:docMkLst>
-      <pc:sldChg chg="modSp">
-        <pc:chgData name="Chris G" userId="ec6dd0bf820af39d" providerId="LiveId" clId="{77B084DB-34BD-4714-AFF6-B98C98F6D19D}" dt="2018-01-19T18:41:39.476" v="445" actId="20577"/>
-        <pc:sldMkLst>
-          <pc:docMk/>
-          <pc:sldMk cId="1175140175" sldId="1735"/>
-        </pc:sldMkLst>
-        <pc:spChg chg="mod">
-          <ac:chgData name="Chris G" userId="ec6dd0bf820af39d" providerId="LiveId" clId="{77B084DB-34BD-4714-AFF6-B98C98F6D19D}" dt="2018-01-19T18:41:39.476" v="445" actId="20577"/>
-          <ac:spMkLst>
-            <pc:docMk/>
-            <pc:sldMk cId="1175140175" sldId="1735"/>
-            <ac:spMk id="2" creationId="{00000000-0000-0000-0000-000000000000}"/>
-          </ac:spMkLst>
-        </pc:spChg>
-      </pc:sldChg>
-      <pc:sldChg chg="modSp add">
-        <pc:chgData name="Chris G" userId="ec6dd0bf820af39d" providerId="LiveId" clId="{77B084DB-34BD-4714-AFF6-B98C98F6D19D}" dt="2018-01-19T18:41:02.716" v="422" actId="27636"/>
-        <pc:sldMkLst>
-          <pc:docMk/>
-          <pc:sldMk cId="2335807216" sldId="1740"/>
-        </pc:sldMkLst>
-        <pc:spChg chg="mod">
-          <ac:chgData name="Chris G" userId="ec6dd0bf820af39d" providerId="LiveId" clId="{77B084DB-34BD-4714-AFF6-B98C98F6D19D}" dt="2018-01-19T18:41:02.716" v="422" actId="27636"/>
-          <ac:spMkLst>
-            <pc:docMk/>
-            <pc:sldMk cId="2335807216" sldId="1740"/>
-            <ac:spMk id="3" creationId="{EEB99570-74B8-496E-9BF0-78D33340D20E}"/>
-          </ac:spMkLst>
-        </pc:spChg>
-      </pc:sldChg>
-      <pc:sldMasterChg chg="modSldLayout">
-        <pc:chgData name="Chris G" userId="ec6dd0bf820af39d" providerId="LiveId" clId="{77B084DB-34BD-4714-AFF6-B98C98F6D19D}" dt="2018-01-19T18:39:27.761" v="397" actId="20577"/>
-        <pc:sldMasterMkLst>
-          <pc:docMk/>
-          <pc:sldMasterMk cId="1056324580" sldId="2147483648"/>
-        </pc:sldMasterMkLst>
-        <pc:sldLayoutChg chg="modSp">
-          <pc:chgData name="Chris G" userId="ec6dd0bf820af39d" providerId="LiveId" clId="{77B084DB-34BD-4714-AFF6-B98C98F6D19D}" dt="2018-01-19T18:39:27.761" v="397" actId="20577"/>
-          <pc:sldLayoutMkLst>
-            <pc:docMk/>
-            <pc:sldMasterMk cId="1056324580" sldId="2147483648"/>
-            <pc:sldLayoutMk cId="2118820008" sldId="2147483650"/>
-          </pc:sldLayoutMkLst>
-          <pc:spChg chg="mod">
-            <ac:chgData name="Chris G" userId="ec6dd0bf820af39d" providerId="LiveId" clId="{77B084DB-34BD-4714-AFF6-B98C98F6D19D}" dt="2018-01-19T18:19:44.033" v="85" actId="20577"/>
-            <ac:spMkLst>
-              <pc:docMk/>
-              <pc:sldMasterMk cId="1056324580" sldId="2147483648"/>
-              <pc:sldLayoutMk cId="2118820008" sldId="2147483650"/>
-              <ac:spMk id="3" creationId="{00000000-0000-0000-0000-000000000000}"/>
-            </ac:spMkLst>
-          </pc:spChg>
-          <pc:spChg chg="mod">
-            <ac:chgData name="Chris G" userId="ec6dd0bf820af39d" providerId="LiveId" clId="{77B084DB-34BD-4714-AFF6-B98C98F6D19D}" dt="2018-01-19T18:39:27.761" v="397" actId="20577"/>
-            <ac:spMkLst>
-              <pc:docMk/>
-              <pc:sldMasterMk cId="1056324580" sldId="2147483648"/>
-              <pc:sldLayoutMk cId="2118820008" sldId="2147483650"/>
-              <ac:spMk id="9" creationId="{00000000-0000-0000-0000-000000000000}"/>
-            </ac:spMkLst>
-          </pc:spChg>
-        </pc:sldLayoutChg>
-        <pc:sldLayoutChg chg="modSp">
-          <pc:chgData name="Chris G" userId="ec6dd0bf820af39d" providerId="LiveId" clId="{77B084DB-34BD-4714-AFF6-B98C98F6D19D}" dt="2018-01-19T18:20:06.082" v="100" actId="20577"/>
-          <pc:sldLayoutMkLst>
-            <pc:docMk/>
-            <pc:sldMasterMk cId="1056324580" sldId="2147483648"/>
-            <pc:sldLayoutMk cId="2665502471" sldId="2147483653"/>
-          </pc:sldLayoutMkLst>
-          <pc:spChg chg="mod">
-            <ac:chgData name="Chris G" userId="ec6dd0bf820af39d" providerId="LiveId" clId="{77B084DB-34BD-4714-AFF6-B98C98F6D19D}" dt="2018-01-19T18:20:04.658" v="99" actId="20577"/>
-            <ac:spMkLst>
-              <pc:docMk/>
-              <pc:sldMasterMk cId="1056324580" sldId="2147483648"/>
-              <pc:sldLayoutMk cId="2665502471" sldId="2147483653"/>
-              <ac:spMk id="4" creationId="{00000000-0000-0000-0000-000000000000}"/>
-            </ac:spMkLst>
-          </pc:spChg>
-          <pc:spChg chg="mod">
-            <ac:chgData name="Chris G" userId="ec6dd0bf820af39d" providerId="LiveId" clId="{77B084DB-34BD-4714-AFF6-B98C98F6D19D}" dt="2018-01-19T18:20:06.082" v="100" actId="20577"/>
-            <ac:spMkLst>
-              <pc:docMk/>
-              <pc:sldMasterMk cId="1056324580" sldId="2147483648"/>
-              <pc:sldLayoutMk cId="2665502471" sldId="2147483653"/>
-              <ac:spMk id="6" creationId="{00000000-0000-0000-0000-000000000000}"/>
-            </ac:spMkLst>
-          </pc:spChg>
-        </pc:sldLayoutChg>
-      </pc:sldMasterChg>
-    </pc:docChg>
-  </pc:docChgLst>
   <pc:docChgLst>
     <pc:chgData name="Chris G" userId="ec6dd0bf820af39d" providerId="LiveId" clId="{A6C1FA34-9980-42BD-90CE-52D17F13C601}"/>
     <pc:docChg chg="undo redo custSel addSld delSld modSld">
@@ -1202,6 +1108,104 @@
       </pc:sldChg>
     </pc:docChg>
   </pc:docChgLst>
+  <pc:docChgLst>
+    <pc:chgData name="Chris G" userId="ec6dd0bf820af39d" providerId="LiveId" clId="{77B084DB-34BD-4714-AFF6-B98C98F6D19D}"/>
+    <pc:docChg chg="custSel addSld delSld modSld modMainMaster">
+      <pc:chgData name="Chris G" userId="ec6dd0bf820af39d" providerId="LiveId" clId="{77B084DB-34BD-4714-AFF6-B98C98F6D19D}" dt="2018-01-19T18:41:39.476" v="445" actId="20577"/>
+      <pc:docMkLst>
+        <pc:docMk/>
+      </pc:docMkLst>
+      <pc:sldChg chg="modSp">
+        <pc:chgData name="Chris G" userId="ec6dd0bf820af39d" providerId="LiveId" clId="{77B084DB-34BD-4714-AFF6-B98C98F6D19D}" dt="2018-01-19T18:41:39.476" v="445" actId="20577"/>
+        <pc:sldMkLst>
+          <pc:docMk/>
+          <pc:sldMk cId="1175140175" sldId="1735"/>
+        </pc:sldMkLst>
+        <pc:spChg chg="mod">
+          <ac:chgData name="Chris G" userId="ec6dd0bf820af39d" providerId="LiveId" clId="{77B084DB-34BD-4714-AFF6-B98C98F6D19D}" dt="2018-01-19T18:41:39.476" v="445" actId="20577"/>
+          <ac:spMkLst>
+            <pc:docMk/>
+            <pc:sldMk cId="1175140175" sldId="1735"/>
+            <ac:spMk id="2" creationId="{00000000-0000-0000-0000-000000000000}"/>
+          </ac:spMkLst>
+        </pc:spChg>
+      </pc:sldChg>
+      <pc:sldChg chg="modSp add">
+        <pc:chgData name="Chris G" userId="ec6dd0bf820af39d" providerId="LiveId" clId="{77B084DB-34BD-4714-AFF6-B98C98F6D19D}" dt="2018-01-19T18:41:02.716" v="422" actId="27636"/>
+        <pc:sldMkLst>
+          <pc:docMk/>
+          <pc:sldMk cId="2335807216" sldId="1740"/>
+        </pc:sldMkLst>
+        <pc:spChg chg="mod">
+          <ac:chgData name="Chris G" userId="ec6dd0bf820af39d" providerId="LiveId" clId="{77B084DB-34BD-4714-AFF6-B98C98F6D19D}" dt="2018-01-19T18:41:02.716" v="422" actId="27636"/>
+          <ac:spMkLst>
+            <pc:docMk/>
+            <pc:sldMk cId="2335807216" sldId="1740"/>
+            <ac:spMk id="3" creationId="{EEB99570-74B8-496E-9BF0-78D33340D20E}"/>
+          </ac:spMkLst>
+        </pc:spChg>
+      </pc:sldChg>
+      <pc:sldMasterChg chg="modSldLayout">
+        <pc:chgData name="Chris G" userId="ec6dd0bf820af39d" providerId="LiveId" clId="{77B084DB-34BD-4714-AFF6-B98C98F6D19D}" dt="2018-01-19T18:39:27.761" v="397" actId="20577"/>
+        <pc:sldMasterMkLst>
+          <pc:docMk/>
+          <pc:sldMasterMk cId="1056324580" sldId="2147483648"/>
+        </pc:sldMasterMkLst>
+        <pc:sldLayoutChg chg="modSp">
+          <pc:chgData name="Chris G" userId="ec6dd0bf820af39d" providerId="LiveId" clId="{77B084DB-34BD-4714-AFF6-B98C98F6D19D}" dt="2018-01-19T18:39:27.761" v="397" actId="20577"/>
+          <pc:sldLayoutMkLst>
+            <pc:docMk/>
+            <pc:sldMasterMk cId="1056324580" sldId="2147483648"/>
+            <pc:sldLayoutMk cId="2118820008" sldId="2147483650"/>
+          </pc:sldLayoutMkLst>
+          <pc:spChg chg="mod">
+            <ac:chgData name="Chris G" userId="ec6dd0bf820af39d" providerId="LiveId" clId="{77B084DB-34BD-4714-AFF6-B98C98F6D19D}" dt="2018-01-19T18:19:44.033" v="85" actId="20577"/>
+            <ac:spMkLst>
+              <pc:docMk/>
+              <pc:sldMasterMk cId="1056324580" sldId="2147483648"/>
+              <pc:sldLayoutMk cId="2118820008" sldId="2147483650"/>
+              <ac:spMk id="3" creationId="{00000000-0000-0000-0000-000000000000}"/>
+            </ac:spMkLst>
+          </pc:spChg>
+          <pc:spChg chg="mod">
+            <ac:chgData name="Chris G" userId="ec6dd0bf820af39d" providerId="LiveId" clId="{77B084DB-34BD-4714-AFF6-B98C98F6D19D}" dt="2018-01-19T18:39:27.761" v="397" actId="20577"/>
+            <ac:spMkLst>
+              <pc:docMk/>
+              <pc:sldMasterMk cId="1056324580" sldId="2147483648"/>
+              <pc:sldLayoutMk cId="2118820008" sldId="2147483650"/>
+              <ac:spMk id="9" creationId="{00000000-0000-0000-0000-000000000000}"/>
+            </ac:spMkLst>
+          </pc:spChg>
+        </pc:sldLayoutChg>
+        <pc:sldLayoutChg chg="modSp">
+          <pc:chgData name="Chris G" userId="ec6dd0bf820af39d" providerId="LiveId" clId="{77B084DB-34BD-4714-AFF6-B98C98F6D19D}" dt="2018-01-19T18:20:06.082" v="100" actId="20577"/>
+          <pc:sldLayoutMkLst>
+            <pc:docMk/>
+            <pc:sldMasterMk cId="1056324580" sldId="2147483648"/>
+            <pc:sldLayoutMk cId="2665502471" sldId="2147483653"/>
+          </pc:sldLayoutMkLst>
+          <pc:spChg chg="mod">
+            <ac:chgData name="Chris G" userId="ec6dd0bf820af39d" providerId="LiveId" clId="{77B084DB-34BD-4714-AFF6-B98C98F6D19D}" dt="2018-01-19T18:20:04.658" v="99" actId="20577"/>
+            <ac:spMkLst>
+              <pc:docMk/>
+              <pc:sldMasterMk cId="1056324580" sldId="2147483648"/>
+              <pc:sldLayoutMk cId="2665502471" sldId="2147483653"/>
+              <ac:spMk id="4" creationId="{00000000-0000-0000-0000-000000000000}"/>
+            </ac:spMkLst>
+          </pc:spChg>
+          <pc:spChg chg="mod">
+            <ac:chgData name="Chris G" userId="ec6dd0bf820af39d" providerId="LiveId" clId="{77B084DB-34BD-4714-AFF6-B98C98F6D19D}" dt="2018-01-19T18:20:06.082" v="100" actId="20577"/>
+            <ac:spMkLst>
+              <pc:docMk/>
+              <pc:sldMasterMk cId="1056324580" sldId="2147483648"/>
+              <pc:sldLayoutMk cId="2665502471" sldId="2147483653"/>
+              <ac:spMk id="6" creationId="{00000000-0000-0000-0000-000000000000}"/>
+            </ac:spMkLst>
+          </pc:spChg>
+        </pc:sldLayoutChg>
+      </pc:sldMasterChg>
+    </pc:docChg>
+  </pc:docChgLst>
 </pc:chgInfo>
 </file>
 
@@ -1287,7 +1291,7 @@
           <a:p>
             <a:fld id="{D27E40BE-1D10-4C80-A8BF-F5AF39EFA189}" type="datetimeFigureOut">
               <a:rPr lang="de-DE" smtClean="0"/>
-              <a:t>21.01.2018</a:t>
+              <a:t>22.01.2018</a:t>
             </a:fld>
             <a:endParaRPr lang="de-DE"/>
           </a:p>
@@ -1452,7 +1456,7 @@
           <a:p>
             <a:fld id="{E2C32285-C8C6-4668-B04E-FA4453CF6A76}" type="datetimeFigureOut">
               <a:rPr lang="de-AT" smtClean="0"/>
-              <a:t>21.01.2018</a:t>
+              <a:t>22.01.2018</a:t>
             </a:fld>
             <a:endParaRPr lang="de-AT"/>
           </a:p>
@@ -1764,7 +1768,7 @@
           <a:bodyPr/>
           <a:lstStyle/>
           <a:p>
-            <a:endParaRPr lang="de-DE" dirty="0"/>
+            <a:endParaRPr lang="de-AT" dirty="0"/>
           </a:p>
         </p:txBody>
       </p:sp>
@@ -1785,7 +1789,7 @@
           <a:p>
             <a:fld id="{EABE0D26-08C0-41F2-9EB8-4EF69F79B2A4}" type="slidenum">
               <a:rPr lang="de-AT" smtClean="0"/>
-              <a:t>9</a:t>
+              <a:t>4</a:t>
             </a:fld>
             <a:endParaRPr lang="de-AT"/>
           </a:p>
@@ -1794,7 +1798,7 @@
     </p:spTree>
     <p:extLst>
       <p:ext uri="{BB962C8B-B14F-4D97-AF65-F5344CB8AC3E}">
-        <p14:creationId xmlns:p14="http://schemas.microsoft.com/office/powerpoint/2010/main" val="1908101786"/>
+        <p14:creationId xmlns:p14="http://schemas.microsoft.com/office/powerpoint/2010/main" val="7833288"/>
       </p:ext>
     </p:extLst>
   </p:cSld>
@@ -1869,7 +1873,7 @@
           <a:p>
             <a:fld id="{EABE0D26-08C0-41F2-9EB8-4EF69F79B2A4}" type="slidenum">
               <a:rPr lang="de-AT" smtClean="0"/>
-              <a:t>10</a:t>
+              <a:t>9</a:t>
             </a:fld>
             <a:endParaRPr lang="de-AT"/>
           </a:p>
@@ -1878,7 +1882,7 @@
     </p:spTree>
     <p:extLst>
       <p:ext uri="{BB962C8B-B14F-4D97-AF65-F5344CB8AC3E}">
-        <p14:creationId xmlns:p14="http://schemas.microsoft.com/office/powerpoint/2010/main" val="1057318708"/>
+        <p14:creationId xmlns:p14="http://schemas.microsoft.com/office/powerpoint/2010/main" val="1908101786"/>
       </p:ext>
     </p:extLst>
   </p:cSld>
@@ -1953,6 +1957,90 @@
           <a:p>
             <a:fld id="{EABE0D26-08C0-41F2-9EB8-4EF69F79B2A4}" type="slidenum">
               <a:rPr lang="de-AT" smtClean="0"/>
+              <a:t>10</a:t>
+            </a:fld>
+            <a:endParaRPr lang="de-AT"/>
+          </a:p>
+        </p:txBody>
+      </p:sp>
+    </p:spTree>
+    <p:extLst>
+      <p:ext uri="{BB962C8B-B14F-4D97-AF65-F5344CB8AC3E}">
+        <p14:creationId xmlns:p14="http://schemas.microsoft.com/office/powerpoint/2010/main" val="1057318708"/>
+      </p:ext>
+    </p:extLst>
+  </p:cSld>
+  <p:clrMapOvr>
+    <a:masterClrMapping/>
+  </p:clrMapOvr>
+</p:notes>
+</file>
+
+<file path=ppt/notesSlides/notesSlide4.xml><?xml version="1.0" encoding="utf-8"?>
+<p:notes xmlns:a="http://schemas.openxmlformats.org/drawingml/2006/main" xmlns:r="http://schemas.openxmlformats.org/officeDocument/2006/relationships" xmlns:p="http://schemas.openxmlformats.org/presentationml/2006/main">
+  <p:cSld>
+    <p:spTree>
+      <p:nvGrpSpPr>
+        <p:cNvPr id="1" name=""/>
+        <p:cNvGrpSpPr/>
+        <p:nvPr/>
+      </p:nvGrpSpPr>
+      <p:grpSpPr>
+        <a:xfrm>
+          <a:off x="0" y="0"/>
+          <a:ext cx="0" cy="0"/>
+          <a:chOff x="0" y="0"/>
+          <a:chExt cx="0" cy="0"/>
+        </a:xfrm>
+      </p:grpSpPr>
+      <p:sp>
+        <p:nvSpPr>
+          <p:cNvPr id="2" name="Folienbildplatzhalter 1"/>
+          <p:cNvSpPr>
+            <a:spLocks noGrp="1" noRot="1" noChangeAspect="1"/>
+          </p:cNvSpPr>
+          <p:nvPr>
+            <p:ph type="sldImg"/>
+          </p:nvPr>
+        </p:nvSpPr>
+        <p:spPr/>
+      </p:sp>
+      <p:sp>
+        <p:nvSpPr>
+          <p:cNvPr id="3" name="Notizenplatzhalter 2"/>
+          <p:cNvSpPr>
+            <a:spLocks noGrp="1"/>
+          </p:cNvSpPr>
+          <p:nvPr>
+            <p:ph type="body" idx="1"/>
+          </p:nvPr>
+        </p:nvSpPr>
+        <p:spPr/>
+        <p:txBody>
+          <a:bodyPr/>
+          <a:lstStyle/>
+          <a:p>
+            <a:endParaRPr lang="de-DE" dirty="0"/>
+          </a:p>
+        </p:txBody>
+      </p:sp>
+      <p:sp>
+        <p:nvSpPr>
+          <p:cNvPr id="4" name="Foliennummernplatzhalter 3"/>
+          <p:cNvSpPr>
+            <a:spLocks noGrp="1"/>
+          </p:cNvSpPr>
+          <p:nvPr>
+            <p:ph type="sldNum" sz="quarter" idx="10"/>
+          </p:nvPr>
+        </p:nvSpPr>
+        <p:spPr/>
+        <p:txBody>
+          <a:bodyPr/>
+          <a:lstStyle/>
+          <a:p>
+            <a:fld id="{EABE0D26-08C0-41F2-9EB8-4EF69F79B2A4}" type="slidenum">
+              <a:rPr lang="de-AT" smtClean="0"/>
               <a:t>11</a:t>
             </a:fld>
             <a:endParaRPr lang="de-AT"/>
@@ -1972,7 +2060,7 @@
 </p:notes>
 </file>
 
-<file path=ppt/notesSlides/notesSlide4.xml><?xml version="1.0" encoding="utf-8"?>
+<file path=ppt/notesSlides/notesSlide5.xml><?xml version="1.0" encoding="utf-8"?>
 <p:notes xmlns:a="http://schemas.openxmlformats.org/drawingml/2006/main" xmlns:r="http://schemas.openxmlformats.org/officeDocument/2006/relationships" xmlns:p="http://schemas.openxmlformats.org/presentationml/2006/main">
   <p:cSld>
     <p:spTree>
@@ -2237,7 +2325,7 @@
           <a:p>
             <a:fld id="{AD7C823A-8D1F-4A7A-BCD3-140CE86C5147}" type="datetime1">
               <a:rPr lang="de-AT" smtClean="0"/>
-              <a:t>21.01.2018</a:t>
+              <a:t>22.01.2018</a:t>
             </a:fld>
             <a:endParaRPr lang="de-AT"/>
           </a:p>
@@ -2660,7 +2748,7 @@
           <a:p>
             <a:fld id="{00C2A7D4-6DA7-4AC0-90DA-495E283232C3}" type="datetime1">
               <a:rPr lang="de-AT" smtClean="0"/>
-              <a:t>21.01.2018</a:t>
+              <a:t>22.01.2018</a:t>
             </a:fld>
             <a:endParaRPr lang="de-AT"/>
           </a:p>
@@ -2911,7 +2999,7 @@
           <a:p>
             <a:fld id="{A6A55E55-235A-4F68-B44B-5B270E39D9BB}" type="datetime1">
               <a:rPr lang="de-AT" smtClean="0"/>
-              <a:t>21.01.2018</a:t>
+              <a:t>22.01.2018</a:t>
             </a:fld>
             <a:endParaRPr lang="de-AT" dirty="0"/>
           </a:p>
@@ -3203,7 +3291,7 @@
           <a:p>
             <a:fld id="{612221E0-5FCF-46D5-8E71-06BE4024C7C9}" type="datetime1">
               <a:rPr lang="de-AT" smtClean="0"/>
-              <a:t>21.01.2018</a:t>
+              <a:t>22.01.2018</a:t>
             </a:fld>
             <a:endParaRPr lang="de-AT" dirty="0"/>
           </a:p>
@@ -3614,7 +3702,7 @@
           <a:p>
             <a:fld id="{2C1BF1B5-1080-4A4D-93FE-2AFC40FEAED7}" type="datetime1">
               <a:rPr lang="de-AT" smtClean="0"/>
-              <a:t>21.01.2018</a:t>
+              <a:t>22.01.2018</a:t>
             </a:fld>
             <a:endParaRPr lang="de-AT"/>
           </a:p>
@@ -3735,7 +3823,7 @@
           <a:p>
             <a:fld id="{17707911-CD8C-4B83-8C1E-2EDDEAF7124F}" type="datetime1">
               <a:rPr lang="de-AT" smtClean="0"/>
-              <a:t>21.01.2018</a:t>
+              <a:t>22.01.2018</a:t>
             </a:fld>
             <a:endParaRPr lang="de-AT"/>
           </a:p>
@@ -3833,7 +3921,7 @@
           <a:p>
             <a:fld id="{B3A57C43-A959-49D5-BD00-F6710B17D347}" type="datetime1">
               <a:rPr lang="de-AT" smtClean="0"/>
-              <a:t>21.01.2018</a:t>
+              <a:t>22.01.2018</a:t>
             </a:fld>
             <a:endParaRPr lang="de-AT"/>
           </a:p>
@@ -4113,7 +4201,7 @@
           <a:p>
             <a:fld id="{11EDFD0D-1B57-4662-AB88-65D7683B137A}" type="datetime1">
               <a:rPr lang="de-AT" smtClean="0"/>
-              <a:t>21.01.2018</a:t>
+              <a:t>22.01.2018</a:t>
             </a:fld>
             <a:endParaRPr lang="de-AT"/>
           </a:p>
@@ -4369,7 +4457,7 @@
           <a:p>
             <a:fld id="{7E79AC9D-681F-4C6C-B748-A22E1014B687}" type="datetime1">
               <a:rPr lang="de-AT" smtClean="0"/>
-              <a:t>21.01.2018</a:t>
+              <a:t>22.01.2018</a:t>
             </a:fld>
             <a:endParaRPr lang="de-AT"/>
           </a:p>
@@ -4542,7 +4630,7 @@
           <a:p>
             <a:fld id="{F88EDF09-200F-4437-870F-6371DDA93B70}" type="datetime1">
               <a:rPr lang="de-AT" smtClean="0"/>
-              <a:t>21.01.2018</a:t>
+              <a:t>22.01.2018</a:t>
             </a:fld>
             <a:endParaRPr lang="de-AT"/>
           </a:p>
@@ -4758,7 +4846,7 @@
           <a:p>
             <a:fld id="{E26C028F-E316-4C0A-9E06-C9E8477B7866}" type="datetime1">
               <a:rPr lang="de-AT" smtClean="0"/>
-              <a:t>21.01.2018</a:t>
+              <a:t>22.01.2018</a:t>
             </a:fld>
             <a:endParaRPr lang="de-AT"/>
           </a:p>
@@ -5591,7 +5679,7 @@
           <a:p>
             <a:fld id="{A6A55E55-235A-4F68-B44B-5B270E39D9BB}" type="datetime1">
               <a:rPr lang="de-AT" smtClean="0"/>
-              <a:t>21.01.2018</a:t>
+              <a:t>22.01.2018</a:t>
             </a:fld>
             <a:endParaRPr lang="de-AT" dirty="0"/>
           </a:p>
@@ -6988,7 +7076,7 @@
           <a:p>
             <a:fld id="{A6A55E55-235A-4F68-B44B-5B270E39D9BB}" type="datetime1">
               <a:rPr lang="de-AT" smtClean="0"/>
-              <a:t>21.01.2018</a:t>
+              <a:t>22.01.2018</a:t>
             </a:fld>
             <a:endParaRPr lang="de-AT" dirty="0"/>
           </a:p>
@@ -8008,7 +8096,7 @@
           <a:p>
             <a:fld id="{A6A55E55-235A-4F68-B44B-5B270E39D9BB}" type="datetime1">
               <a:rPr lang="de-AT" smtClean="0"/>
-              <a:t>21.01.2018</a:t>
+              <a:t>22.01.2018</a:t>
             </a:fld>
             <a:endParaRPr lang="de-AT" dirty="0"/>
           </a:p>
@@ -8442,7 +8530,7 @@
           <p:nvPr/>
         </p:nvPicPr>
         <p:blipFill>
-          <a:blip r:embed="rId3">
+          <a:blip r:embed="rId3" cstate="print">
             <a:extLst>
               <a:ext uri="{28A0092B-C50C-407E-A947-70E740481C1C}">
                 <a14:useLocalDpi xmlns:a14="http://schemas.microsoft.com/office/drawing/2010/main" val="0"/>
@@ -8478,7 +8566,7 @@
           <p:nvPr/>
         </p:nvPicPr>
         <p:blipFill>
-          <a:blip r:embed="rId3">
+          <a:blip r:embed="rId3" cstate="print">
             <a:extLst>
               <a:ext uri="{28A0092B-C50C-407E-A947-70E740481C1C}">
                 <a14:useLocalDpi xmlns:a14="http://schemas.microsoft.com/office/drawing/2010/main" val="0"/>
@@ -8928,7 +9016,7 @@
           <a:p>
             <a:fld id="{34DA982F-5563-4A76-B5F3-2BDEBD27B3E2}" type="datetime1">
               <a:rPr lang="de-AT" smtClean="0"/>
-              <a:t>21.01.2018</a:t>
+              <a:t>22.01.2018</a:t>
             </a:fld>
             <a:endParaRPr lang="de-AT" dirty="0"/>
           </a:p>
@@ -9024,882 +9112,6 @@
       </p:grpSpPr>
       <p:sp>
         <p:nvSpPr>
-          <p:cNvPr id="8" name="Titel 7">
-            <a:extLst>
-              <a:ext uri="{FF2B5EF4-FFF2-40B4-BE49-F238E27FC236}">
-                <a16:creationId xmlns:a16="http://schemas.microsoft.com/office/drawing/2014/main" id="{B4C15081-4C46-4C61-946B-BAC305253743}"/>
-              </a:ext>
-            </a:extLst>
-          </p:cNvPr>
-          <p:cNvSpPr>
-            <a:spLocks noGrp="1"/>
-          </p:cNvSpPr>
-          <p:nvPr>
-            <p:ph type="title" idx="4294967295"/>
-          </p:nvPr>
-        </p:nvSpPr>
-        <p:spPr>
-          <a:xfrm>
-            <a:off x="116467" y="116632"/>
-            <a:ext cx="8915400" cy="1143000"/>
-          </a:xfrm>
-        </p:spPr>
-        <p:txBody>
-          <a:bodyPr>
-            <a:normAutofit/>
-          </a:bodyPr>
-          <a:lstStyle/>
-          <a:p>
-            <a:r>
-              <a:rPr lang="de-DE" dirty="0">
-                <a:solidFill>
-                  <a:schemeClr val="bg1"/>
-                </a:solidFill>
-              </a:rPr>
-              <a:t>Project </a:t>
-            </a:r>
-            <a:r>
-              <a:rPr lang="de-DE" dirty="0" err="1">
-                <a:solidFill>
-                  <a:schemeClr val="bg1"/>
-                </a:solidFill>
-              </a:rPr>
-              <a:t>use</a:t>
-            </a:r>
-            <a:r>
-              <a:rPr lang="de-DE" dirty="0">
-                <a:solidFill>
-                  <a:schemeClr val="bg1"/>
-                </a:solidFill>
-              </a:rPr>
-              <a:t> </a:t>
-            </a:r>
-            <a:r>
-              <a:rPr lang="de-DE" dirty="0" err="1">
-                <a:solidFill>
-                  <a:schemeClr val="bg1"/>
-                </a:solidFill>
-              </a:rPr>
-              <a:t>case</a:t>
-            </a:r>
-            <a:endParaRPr lang="de-DE" dirty="0">
-              <a:solidFill>
-                <a:schemeClr val="bg1"/>
-              </a:solidFill>
-            </a:endParaRPr>
-          </a:p>
-        </p:txBody>
-      </p:sp>
-      <p:sp>
-        <p:nvSpPr>
-          <p:cNvPr id="4" name="Datumsplatzhalter 3">
-            <a:extLst>
-              <a:ext uri="{FF2B5EF4-FFF2-40B4-BE49-F238E27FC236}">
-                <a16:creationId xmlns:a16="http://schemas.microsoft.com/office/drawing/2014/main" id="{82014930-B991-4842-9356-CB5C23CCA0DD}"/>
-              </a:ext>
-            </a:extLst>
-          </p:cNvPr>
-          <p:cNvSpPr>
-            <a:spLocks noGrp="1"/>
-          </p:cNvSpPr>
-          <p:nvPr>
-            <p:ph type="dt" sz="half" idx="10"/>
-          </p:nvPr>
-        </p:nvSpPr>
-        <p:spPr/>
-        <p:txBody>
-          <a:bodyPr/>
-          <a:lstStyle/>
-          <a:p>
-            <a:fld id="{A6A55E55-235A-4F68-B44B-5B270E39D9BB}" type="datetime1">
-              <a:rPr lang="de-AT" smtClean="0"/>
-              <a:t>21.01.2018</a:t>
-            </a:fld>
-            <a:endParaRPr lang="de-AT" dirty="0"/>
-          </a:p>
-        </p:txBody>
-      </p:sp>
-      <p:sp>
-        <p:nvSpPr>
-          <p:cNvPr id="5" name="Fußzeilenplatzhalter 4">
-            <a:extLst>
-              <a:ext uri="{FF2B5EF4-FFF2-40B4-BE49-F238E27FC236}">
-                <a16:creationId xmlns:a16="http://schemas.microsoft.com/office/drawing/2014/main" id="{C6F28DD9-7E24-4860-A748-0423524A91F2}"/>
-              </a:ext>
-            </a:extLst>
-          </p:cNvPr>
-          <p:cNvSpPr>
-            <a:spLocks noGrp="1"/>
-          </p:cNvSpPr>
-          <p:nvPr>
-            <p:ph type="ftr" sz="quarter" idx="11"/>
-          </p:nvPr>
-        </p:nvSpPr>
-        <p:spPr/>
-        <p:txBody>
-          <a:bodyPr/>
-          <a:lstStyle/>
-          <a:p>
-            <a:r>
-              <a:rPr lang="de-AT"/>
-              <a:t>Project Management Methods - "Mars Expedition"</a:t>
-            </a:r>
-            <a:endParaRPr lang="de-AT" dirty="0"/>
-          </a:p>
-        </p:txBody>
-      </p:sp>
-      <p:sp>
-        <p:nvSpPr>
-          <p:cNvPr id="6" name="Foliennummernplatzhalter 5">
-            <a:extLst>
-              <a:ext uri="{FF2B5EF4-FFF2-40B4-BE49-F238E27FC236}">
-                <a16:creationId xmlns:a16="http://schemas.microsoft.com/office/drawing/2014/main" id="{74388B65-7CD4-4103-AFA7-148FA1E04B84}"/>
-              </a:ext>
-            </a:extLst>
-          </p:cNvPr>
-          <p:cNvSpPr>
-            <a:spLocks noGrp="1"/>
-          </p:cNvSpPr>
-          <p:nvPr>
-            <p:ph type="sldNum" sz="quarter" idx="12"/>
-          </p:nvPr>
-        </p:nvSpPr>
-        <p:spPr/>
-        <p:txBody>
-          <a:bodyPr/>
-          <a:lstStyle/>
-          <a:p>
-            <a:fld id="{3B0692D3-3767-4542-A95D-53684A81B966}" type="slidenum">
-              <a:rPr lang="de-AT" smtClean="0"/>
-              <a:t>3</a:t>
-            </a:fld>
-            <a:endParaRPr lang="de-AT" dirty="0"/>
-          </a:p>
-        </p:txBody>
-      </p:sp>
-      <p:sp>
-        <p:nvSpPr>
-          <p:cNvPr id="7" name="Inhaltsplatzhalter 6">
-            <a:extLst>
-              <a:ext uri="{FF2B5EF4-FFF2-40B4-BE49-F238E27FC236}">
-                <a16:creationId xmlns:a16="http://schemas.microsoft.com/office/drawing/2014/main" id="{7E34B61F-2172-4281-AC62-588A00022539}"/>
-              </a:ext>
-            </a:extLst>
-          </p:cNvPr>
-          <p:cNvSpPr>
-            <a:spLocks noGrp="1"/>
-          </p:cNvSpPr>
-          <p:nvPr>
-            <p:ph idx="1"/>
-          </p:nvPr>
-        </p:nvSpPr>
-        <p:spPr/>
-        <p:txBody>
-          <a:bodyPr>
-            <a:normAutofit/>
-          </a:bodyPr>
-          <a:lstStyle/>
-          <a:p>
-            <a:pPr marL="0" indent="0">
-              <a:lnSpc>
-                <a:spcPct val="150000"/>
-              </a:lnSpc>
-              <a:buNone/>
-            </a:pPr>
-            <a:r>
-              <a:rPr lang="en-GB" sz="1800" b="1" dirty="0">
-                <a:latin typeface="+mn-lt"/>
-                <a:ea typeface="+mn-ea"/>
-                <a:cs typeface="+mn-cs"/>
-              </a:rPr>
-              <a:t>Phase planning</a:t>
-            </a:r>
-          </a:p>
-          <a:p>
-            <a:pPr lvl="1">
-              <a:lnSpc>
-                <a:spcPct val="150000"/>
-              </a:lnSpc>
-              <a:buFont typeface="Wingdings" panose="05000000000000000000" pitchFamily="2" charset="2"/>
-              <a:buChar char="Ø"/>
-            </a:pPr>
-            <a:r>
-              <a:rPr lang="en-GB" sz="1600" dirty="0">
-                <a:latin typeface="+mn-lt"/>
-                <a:ea typeface="+mn-ea"/>
-                <a:cs typeface="+mn-cs"/>
-              </a:rPr>
-              <a:t>Conception phase</a:t>
-            </a:r>
-          </a:p>
-          <a:p>
-            <a:pPr lvl="1">
-              <a:lnSpc>
-                <a:spcPct val="150000"/>
-              </a:lnSpc>
-              <a:buFont typeface="Wingdings" panose="05000000000000000000" pitchFamily="2" charset="2"/>
-              <a:buChar char="Ø"/>
-            </a:pPr>
-            <a:r>
-              <a:rPr lang="en-GB" sz="1600" dirty="0">
-                <a:latin typeface="+mn-lt"/>
-                <a:ea typeface="+mn-ea"/>
-                <a:cs typeface="+mn-cs"/>
-              </a:rPr>
-              <a:t>Define and Planning phase</a:t>
-            </a:r>
-          </a:p>
-          <a:p>
-            <a:pPr lvl="1">
-              <a:lnSpc>
-                <a:spcPct val="150000"/>
-              </a:lnSpc>
-              <a:buFont typeface="Wingdings" panose="05000000000000000000" pitchFamily="2" charset="2"/>
-              <a:buChar char="Ø"/>
-            </a:pPr>
-            <a:r>
-              <a:rPr lang="en-GB" sz="1600" dirty="0">
-                <a:latin typeface="+mn-lt"/>
-                <a:ea typeface="+mn-ea"/>
-                <a:cs typeface="+mn-cs"/>
-              </a:rPr>
-              <a:t>Execution Phase</a:t>
-            </a:r>
-          </a:p>
-          <a:p>
-            <a:pPr lvl="1">
-              <a:lnSpc>
-                <a:spcPct val="150000"/>
-              </a:lnSpc>
-              <a:buFont typeface="Wingdings" panose="05000000000000000000" pitchFamily="2" charset="2"/>
-              <a:buChar char="Ø"/>
-            </a:pPr>
-            <a:r>
-              <a:rPr lang="en-GB" sz="1600" dirty="0">
-                <a:latin typeface="+mn-lt"/>
-                <a:ea typeface="+mn-ea"/>
-                <a:cs typeface="+mn-cs"/>
-              </a:rPr>
-              <a:t>Mars Landing</a:t>
-            </a:r>
-          </a:p>
-          <a:p>
-            <a:pPr lvl="1">
-              <a:lnSpc>
-                <a:spcPct val="150000"/>
-              </a:lnSpc>
-              <a:buFont typeface="Wingdings" panose="05000000000000000000" pitchFamily="2" charset="2"/>
-              <a:buChar char="Ø"/>
-            </a:pPr>
-            <a:endParaRPr lang="en-GB" sz="1400" dirty="0">
-              <a:latin typeface="+mn-lt"/>
-              <a:ea typeface="+mn-ea"/>
-              <a:cs typeface="+mn-cs"/>
-            </a:endParaRPr>
-          </a:p>
-          <a:p>
-            <a:pPr marL="342108" lvl="1" indent="-285750">
-              <a:lnSpc>
-                <a:spcPct val="150000"/>
-              </a:lnSpc>
-              <a:buFont typeface="Wingdings" panose="05000000000000000000" pitchFamily="2" charset="2"/>
-              <a:buChar char="Ø"/>
-            </a:pPr>
-            <a:r>
-              <a:rPr lang="en-GB" sz="1800" dirty="0">
-                <a:latin typeface="+mn-lt"/>
-                <a:ea typeface="+mn-ea"/>
-                <a:cs typeface="+mn-cs"/>
-              </a:rPr>
-              <a:t>Structure</a:t>
-            </a:r>
-          </a:p>
-          <a:p>
-            <a:pPr marL="342108" lvl="1" indent="-285750">
-              <a:lnSpc>
-                <a:spcPct val="150000"/>
-              </a:lnSpc>
-              <a:buFont typeface="Wingdings" panose="05000000000000000000" pitchFamily="2" charset="2"/>
-              <a:buChar char="Ø"/>
-            </a:pPr>
-            <a:r>
-              <a:rPr lang="en-GB" sz="1800" dirty="0">
-                <a:latin typeface="+mn-lt"/>
-                <a:ea typeface="+mn-ea"/>
-                <a:cs typeface="+mn-cs"/>
-              </a:rPr>
-              <a:t>Set up activities</a:t>
-            </a:r>
-          </a:p>
-          <a:p>
-            <a:pPr marL="342000" lvl="1">
-              <a:lnSpc>
-                <a:spcPct val="150000"/>
-              </a:lnSpc>
-              <a:buFont typeface="Wingdings" panose="05000000000000000000" pitchFamily="2" charset="2"/>
-              <a:buChar char="Ø"/>
-            </a:pPr>
-            <a:r>
-              <a:rPr lang="en-GB" sz="1800" dirty="0">
-                <a:latin typeface="+mn-lt"/>
-                <a:ea typeface="+mn-ea"/>
-                <a:cs typeface="+mn-cs"/>
-              </a:rPr>
-              <a:t>Work step by step</a:t>
-            </a:r>
-          </a:p>
-          <a:p>
-            <a:pPr marL="457028" lvl="1" indent="0">
-              <a:lnSpc>
-                <a:spcPct val="150000"/>
-              </a:lnSpc>
-              <a:buNone/>
-            </a:pPr>
-            <a:endParaRPr lang="de-AT" sz="1400" dirty="0">
-              <a:latin typeface="+mn-lt"/>
-              <a:ea typeface="+mn-ea"/>
-              <a:cs typeface="+mn-cs"/>
-            </a:endParaRPr>
-          </a:p>
-          <a:p>
-            <a:pPr lvl="1">
-              <a:buFont typeface="Wingdings" panose="05000000000000000000" pitchFamily="2" charset="2"/>
-              <a:buChar char="Ø"/>
-            </a:pPr>
-            <a:endParaRPr lang="de-AT" sz="1400" dirty="0">
-              <a:latin typeface="+mn-lt"/>
-              <a:ea typeface="+mn-ea"/>
-              <a:cs typeface="+mn-cs"/>
-            </a:endParaRPr>
-          </a:p>
-          <a:p>
-            <a:pPr marL="457028" lvl="1" indent="0">
-              <a:buNone/>
-            </a:pPr>
-            <a:endParaRPr lang="de-AT" sz="1400" dirty="0">
-              <a:latin typeface="+mn-lt"/>
-              <a:ea typeface="+mn-ea"/>
-              <a:cs typeface="+mn-cs"/>
-            </a:endParaRPr>
-          </a:p>
-          <a:p>
-            <a:pPr lvl="1">
-              <a:buFont typeface="Wingdings" panose="05000000000000000000" pitchFamily="2" charset="2"/>
-              <a:buChar char="Ø"/>
-            </a:pPr>
-            <a:endParaRPr lang="de-AT" dirty="0"/>
-          </a:p>
-        </p:txBody>
-      </p:sp>
-      <p:pic>
-        <p:nvPicPr>
-          <p:cNvPr id="9" name="Grafik 8">
-            <a:extLst>
-              <a:ext uri="{FF2B5EF4-FFF2-40B4-BE49-F238E27FC236}">
-                <a16:creationId xmlns:a16="http://schemas.microsoft.com/office/drawing/2014/main" id="{B2140789-E50F-4DF1-847E-D0E963506754}"/>
-              </a:ext>
-            </a:extLst>
-          </p:cNvPr>
-          <p:cNvPicPr>
-            <a:picLocks noChangeAspect="1"/>
-          </p:cNvPicPr>
-          <p:nvPr/>
-        </p:nvPicPr>
-        <p:blipFill rotWithShape="1">
-          <a:blip r:embed="rId2"/>
-          <a:srcRect l="24558" t="47414" r="60904" b="28021"/>
-          <a:stretch/>
-        </p:blipFill>
-        <p:spPr>
-          <a:xfrm>
-            <a:off x="2792760" y="2915121"/>
-            <a:ext cx="2501059" cy="2376000"/>
-          </a:xfrm>
-          <a:prstGeom prst="rect">
-            <a:avLst/>
-          </a:prstGeom>
-        </p:spPr>
-      </p:pic>
-    </p:spTree>
-    <p:extLst>
-      <p:ext uri="{BB962C8B-B14F-4D97-AF65-F5344CB8AC3E}">
-        <p14:creationId xmlns:p14="http://schemas.microsoft.com/office/powerpoint/2010/main" val="2739111897"/>
-      </p:ext>
-    </p:extLst>
-  </p:cSld>
-  <p:clrMapOvr>
-    <a:masterClrMapping/>
-  </p:clrMapOvr>
-</p:sld>
-</file>
-
-<file path=ppt/slides/slide4.xml><?xml version="1.0" encoding="utf-8"?>
-<p:sld xmlns:a="http://schemas.openxmlformats.org/drawingml/2006/main" xmlns:r="http://schemas.openxmlformats.org/officeDocument/2006/relationships" xmlns:p="http://schemas.openxmlformats.org/presentationml/2006/main">
-  <p:cSld>
-    <p:spTree>
-      <p:nvGrpSpPr>
-        <p:cNvPr id="1" name=""/>
-        <p:cNvGrpSpPr/>
-        <p:nvPr/>
-      </p:nvGrpSpPr>
-      <p:grpSpPr>
-        <a:xfrm>
-          <a:off x="0" y="0"/>
-          <a:ext cx="0" cy="0"/>
-          <a:chOff x="0" y="0"/>
-          <a:chExt cx="0" cy="0"/>
-        </a:xfrm>
-      </p:grpSpPr>
-      <p:sp>
-        <p:nvSpPr>
-          <p:cNvPr id="8" name="Titel 7">
-            <a:extLst>
-              <a:ext uri="{FF2B5EF4-FFF2-40B4-BE49-F238E27FC236}">
-                <a16:creationId xmlns:a16="http://schemas.microsoft.com/office/drawing/2014/main" id="{B4C15081-4C46-4C61-946B-BAC305253743}"/>
-              </a:ext>
-            </a:extLst>
-          </p:cNvPr>
-          <p:cNvSpPr>
-            <a:spLocks noGrp="1"/>
-          </p:cNvSpPr>
-          <p:nvPr>
-            <p:ph type="title" idx="4294967295"/>
-          </p:nvPr>
-        </p:nvSpPr>
-        <p:spPr>
-          <a:xfrm>
-            <a:off x="116467" y="116632"/>
-            <a:ext cx="8915400" cy="1143000"/>
-          </a:xfrm>
-        </p:spPr>
-        <p:txBody>
-          <a:bodyPr>
-            <a:normAutofit/>
-          </a:bodyPr>
-          <a:lstStyle/>
-          <a:p>
-            <a:r>
-              <a:rPr lang="de-DE" dirty="0">
-                <a:solidFill>
-                  <a:schemeClr val="bg1"/>
-                </a:solidFill>
-              </a:rPr>
-              <a:t>Project </a:t>
-            </a:r>
-            <a:r>
-              <a:rPr lang="de-DE" dirty="0" err="1">
-                <a:solidFill>
-                  <a:schemeClr val="bg1"/>
-                </a:solidFill>
-              </a:rPr>
-              <a:t>use</a:t>
-            </a:r>
-            <a:r>
-              <a:rPr lang="de-DE" dirty="0">
-                <a:solidFill>
-                  <a:schemeClr val="bg1"/>
-                </a:solidFill>
-              </a:rPr>
-              <a:t> </a:t>
-            </a:r>
-            <a:r>
-              <a:rPr lang="de-DE" dirty="0" err="1">
-                <a:solidFill>
-                  <a:schemeClr val="bg1"/>
-                </a:solidFill>
-              </a:rPr>
-              <a:t>case</a:t>
-            </a:r>
-            <a:endParaRPr lang="de-DE" dirty="0">
-              <a:solidFill>
-                <a:schemeClr val="bg1"/>
-              </a:solidFill>
-            </a:endParaRPr>
-          </a:p>
-        </p:txBody>
-      </p:sp>
-      <p:sp>
-        <p:nvSpPr>
-          <p:cNvPr id="4" name="Datumsplatzhalter 3">
-            <a:extLst>
-              <a:ext uri="{FF2B5EF4-FFF2-40B4-BE49-F238E27FC236}">
-                <a16:creationId xmlns:a16="http://schemas.microsoft.com/office/drawing/2014/main" id="{82014930-B991-4842-9356-CB5C23CCA0DD}"/>
-              </a:ext>
-            </a:extLst>
-          </p:cNvPr>
-          <p:cNvSpPr>
-            <a:spLocks noGrp="1"/>
-          </p:cNvSpPr>
-          <p:nvPr>
-            <p:ph type="dt" sz="half" idx="10"/>
-          </p:nvPr>
-        </p:nvSpPr>
-        <p:spPr/>
-        <p:txBody>
-          <a:bodyPr/>
-          <a:lstStyle/>
-          <a:p>
-            <a:fld id="{A6A55E55-235A-4F68-B44B-5B270E39D9BB}" type="datetime1">
-              <a:rPr lang="de-AT" smtClean="0"/>
-              <a:t>21.01.2018</a:t>
-            </a:fld>
-            <a:endParaRPr lang="de-AT" dirty="0"/>
-          </a:p>
-        </p:txBody>
-      </p:sp>
-      <p:sp>
-        <p:nvSpPr>
-          <p:cNvPr id="5" name="Fußzeilenplatzhalter 4">
-            <a:extLst>
-              <a:ext uri="{FF2B5EF4-FFF2-40B4-BE49-F238E27FC236}">
-                <a16:creationId xmlns:a16="http://schemas.microsoft.com/office/drawing/2014/main" id="{C6F28DD9-7E24-4860-A748-0423524A91F2}"/>
-              </a:ext>
-            </a:extLst>
-          </p:cNvPr>
-          <p:cNvSpPr>
-            <a:spLocks noGrp="1"/>
-          </p:cNvSpPr>
-          <p:nvPr>
-            <p:ph type="ftr" sz="quarter" idx="11"/>
-          </p:nvPr>
-        </p:nvSpPr>
-        <p:spPr/>
-        <p:txBody>
-          <a:bodyPr/>
-          <a:lstStyle/>
-          <a:p>
-            <a:r>
-              <a:rPr lang="de-AT"/>
-              <a:t>Project Management Methods - "Mars Expedition"</a:t>
-            </a:r>
-            <a:endParaRPr lang="de-AT" dirty="0"/>
-          </a:p>
-        </p:txBody>
-      </p:sp>
-      <p:sp>
-        <p:nvSpPr>
-          <p:cNvPr id="6" name="Foliennummernplatzhalter 5">
-            <a:extLst>
-              <a:ext uri="{FF2B5EF4-FFF2-40B4-BE49-F238E27FC236}">
-                <a16:creationId xmlns:a16="http://schemas.microsoft.com/office/drawing/2014/main" id="{74388B65-7CD4-4103-AFA7-148FA1E04B84}"/>
-              </a:ext>
-            </a:extLst>
-          </p:cNvPr>
-          <p:cNvSpPr>
-            <a:spLocks noGrp="1"/>
-          </p:cNvSpPr>
-          <p:nvPr>
-            <p:ph type="sldNum" sz="quarter" idx="12"/>
-          </p:nvPr>
-        </p:nvSpPr>
-        <p:spPr/>
-        <p:txBody>
-          <a:bodyPr/>
-          <a:lstStyle/>
-          <a:p>
-            <a:fld id="{3B0692D3-3767-4542-A95D-53684A81B966}" type="slidenum">
-              <a:rPr lang="de-AT" smtClean="0"/>
-              <a:t>4</a:t>
-            </a:fld>
-            <a:endParaRPr lang="de-AT" dirty="0"/>
-          </a:p>
-        </p:txBody>
-      </p:sp>
-      <p:sp>
-        <p:nvSpPr>
-          <p:cNvPr id="7" name="Inhaltsplatzhalter 6">
-            <a:extLst>
-              <a:ext uri="{FF2B5EF4-FFF2-40B4-BE49-F238E27FC236}">
-                <a16:creationId xmlns:a16="http://schemas.microsoft.com/office/drawing/2014/main" id="{7E34B61F-2172-4281-AC62-588A00022539}"/>
-              </a:ext>
-            </a:extLst>
-          </p:cNvPr>
-          <p:cNvSpPr>
-            <a:spLocks noGrp="1"/>
-          </p:cNvSpPr>
-          <p:nvPr>
-            <p:ph idx="1"/>
-          </p:nvPr>
-        </p:nvSpPr>
-        <p:spPr>
-          <a:xfrm>
-            <a:off x="495300" y="1412776"/>
-            <a:ext cx="8915400" cy="4713393"/>
-          </a:xfrm>
-        </p:spPr>
-        <p:txBody>
-          <a:bodyPr>
-            <a:normAutofit/>
-          </a:bodyPr>
-          <a:lstStyle/>
-          <a:p>
-            <a:pPr marL="0" lvl="1" indent="0">
-              <a:lnSpc>
-                <a:spcPct val="150000"/>
-              </a:lnSpc>
-              <a:buNone/>
-            </a:pPr>
-            <a:r>
-              <a:rPr lang="en-GB" sz="1800" b="1" dirty="0">
-                <a:latin typeface="+mn-lt"/>
-                <a:ea typeface="+mn-ea"/>
-                <a:cs typeface="+mn-cs"/>
-              </a:rPr>
-              <a:t>Milestones</a:t>
-            </a:r>
-          </a:p>
-          <a:p>
-            <a:pPr lvl="1">
-              <a:lnSpc>
-                <a:spcPct val="150000"/>
-              </a:lnSpc>
-              <a:buFont typeface="Wingdings" panose="05000000000000000000" pitchFamily="2" charset="2"/>
-              <a:buChar char="Ø"/>
-            </a:pPr>
-            <a:r>
-              <a:rPr lang="en-GB" sz="1600" dirty="0">
-                <a:latin typeface="+mn-lt"/>
-                <a:ea typeface="+mn-ea"/>
-                <a:cs typeface="+mn-cs"/>
-              </a:rPr>
-              <a:t>1st: Structure, basic concept, distribution of roles</a:t>
-            </a:r>
-          </a:p>
-          <a:p>
-            <a:pPr lvl="1">
-              <a:lnSpc>
-                <a:spcPct val="150000"/>
-              </a:lnSpc>
-              <a:buFont typeface="Wingdings" panose="05000000000000000000" pitchFamily="2" charset="2"/>
-              <a:buChar char="Ø"/>
-            </a:pPr>
-            <a:r>
-              <a:rPr lang="en-GB" sz="1600" dirty="0">
-                <a:latin typeface="+mn-lt"/>
-                <a:ea typeface="+mn-ea"/>
-                <a:cs typeface="+mn-cs"/>
-              </a:rPr>
-              <a:t>2nd: Prototyping our  </a:t>
-            </a:r>
-            <a:r>
-              <a:rPr lang="en-GB" sz="1600" dirty="0" err="1">
-                <a:latin typeface="+mn-lt"/>
-                <a:ea typeface="+mn-ea"/>
-                <a:cs typeface="+mn-cs"/>
-              </a:rPr>
-              <a:t>Mohne</a:t>
-            </a:r>
-            <a:endParaRPr lang="en-GB" sz="1600" dirty="0">
-              <a:latin typeface="+mn-lt"/>
-              <a:ea typeface="+mn-ea"/>
-              <a:cs typeface="+mn-cs"/>
-            </a:endParaRPr>
-          </a:p>
-          <a:p>
-            <a:pPr lvl="1">
-              <a:lnSpc>
-                <a:spcPct val="150000"/>
-              </a:lnSpc>
-              <a:buFont typeface="Wingdings" panose="05000000000000000000" pitchFamily="2" charset="2"/>
-              <a:buChar char="Ø"/>
-            </a:pPr>
-            <a:r>
-              <a:rPr lang="en-GB" sz="1600" dirty="0">
-                <a:latin typeface="+mn-lt"/>
-                <a:ea typeface="+mn-ea"/>
-                <a:cs typeface="+mn-cs"/>
-              </a:rPr>
-              <a:t>3rd: Optimization for our finalisation phase</a:t>
-            </a:r>
-          </a:p>
-          <a:p>
-            <a:pPr lvl="1">
-              <a:lnSpc>
-                <a:spcPct val="150000"/>
-              </a:lnSpc>
-              <a:buFont typeface="Wingdings" panose="05000000000000000000" pitchFamily="2" charset="2"/>
-              <a:buChar char="Ø"/>
-            </a:pPr>
-            <a:endParaRPr lang="en-GB" sz="1600" dirty="0">
-              <a:latin typeface="+mn-lt"/>
-              <a:ea typeface="+mn-ea"/>
-              <a:cs typeface="+mn-cs"/>
-            </a:endParaRPr>
-          </a:p>
-          <a:p>
-            <a:pPr marL="342108" lvl="1" indent="-285750">
-              <a:lnSpc>
-                <a:spcPct val="150000"/>
-              </a:lnSpc>
-              <a:buFont typeface="Wingdings" panose="05000000000000000000" pitchFamily="2" charset="2"/>
-              <a:buChar char="Ø"/>
-            </a:pPr>
-            <a:r>
-              <a:rPr lang="en-GB" sz="1800" dirty="0">
-                <a:latin typeface="+mn-lt"/>
-                <a:ea typeface="+mn-ea"/>
-                <a:cs typeface="+mn-cs"/>
-              </a:rPr>
-              <a:t>Control project progression</a:t>
-            </a:r>
-          </a:p>
-          <a:p>
-            <a:pPr marL="342108" lvl="1" indent="-285750">
-              <a:lnSpc>
-                <a:spcPct val="150000"/>
-              </a:lnSpc>
-              <a:buFont typeface="Wingdings" panose="05000000000000000000" pitchFamily="2" charset="2"/>
-              <a:buChar char="Ø"/>
-            </a:pPr>
-            <a:r>
-              <a:rPr lang="en-GB" sz="1800" dirty="0">
-                <a:latin typeface="+mn-lt"/>
-                <a:ea typeface="+mn-ea"/>
-                <a:cs typeface="+mn-cs"/>
-              </a:rPr>
-              <a:t>Relief project planning</a:t>
-            </a:r>
-          </a:p>
-          <a:p>
-            <a:pPr marL="56358" lvl="1" indent="0">
-              <a:lnSpc>
-                <a:spcPct val="150000"/>
-              </a:lnSpc>
-              <a:buNone/>
-            </a:pPr>
-            <a:endParaRPr lang="en-GB" sz="1800" dirty="0">
-              <a:latin typeface="+mn-lt"/>
-              <a:ea typeface="+mn-ea"/>
-              <a:cs typeface="+mn-cs"/>
-            </a:endParaRPr>
-          </a:p>
-          <a:p>
-            <a:pPr lvl="1">
-              <a:lnSpc>
-                <a:spcPct val="150000"/>
-              </a:lnSpc>
-              <a:buFont typeface="Wingdings" panose="05000000000000000000" pitchFamily="2" charset="2"/>
-              <a:buChar char="Ø"/>
-            </a:pPr>
-            <a:endParaRPr lang="en-GB" sz="1600" dirty="0">
-              <a:latin typeface="+mn-lt"/>
-              <a:ea typeface="+mn-ea"/>
-              <a:cs typeface="+mn-cs"/>
-            </a:endParaRPr>
-          </a:p>
-          <a:p>
-            <a:pPr marL="342770" lvl="1" indent="-342770">
-              <a:buFont typeface="Wingdings" panose="05000000000000000000" pitchFamily="2" charset="2"/>
-              <a:buChar char="Ø"/>
-            </a:pPr>
-            <a:endParaRPr lang="de-AT" sz="1800" dirty="0">
-              <a:latin typeface="+mn-lt"/>
-              <a:ea typeface="+mn-ea"/>
-              <a:cs typeface="+mn-cs"/>
-            </a:endParaRPr>
-          </a:p>
-          <a:p>
-            <a:pPr lvl="1">
-              <a:buFont typeface="Wingdings" panose="05000000000000000000" pitchFamily="2" charset="2"/>
-              <a:buChar char="Ø"/>
-            </a:pPr>
-            <a:endParaRPr lang="de-AT" sz="1400" dirty="0">
-              <a:latin typeface="+mn-lt"/>
-              <a:ea typeface="+mn-ea"/>
-              <a:cs typeface="+mn-cs"/>
-            </a:endParaRPr>
-          </a:p>
-          <a:p>
-            <a:pPr lvl="1">
-              <a:buFont typeface="Wingdings" panose="05000000000000000000" pitchFamily="2" charset="2"/>
-              <a:buChar char="Ø"/>
-            </a:pPr>
-            <a:endParaRPr lang="de-AT" sz="1400" dirty="0">
-              <a:latin typeface="+mn-lt"/>
-              <a:ea typeface="+mn-ea"/>
-              <a:cs typeface="+mn-cs"/>
-            </a:endParaRPr>
-          </a:p>
-          <a:p>
-            <a:pPr marL="457028" lvl="1" indent="0">
-              <a:buNone/>
-            </a:pPr>
-            <a:endParaRPr lang="de-AT" sz="1400" dirty="0">
-              <a:latin typeface="+mn-lt"/>
-              <a:ea typeface="+mn-ea"/>
-              <a:cs typeface="+mn-cs"/>
-            </a:endParaRPr>
-          </a:p>
-          <a:p>
-            <a:pPr lvl="1">
-              <a:buFont typeface="Wingdings" panose="05000000000000000000" pitchFamily="2" charset="2"/>
-              <a:buChar char="Ø"/>
-            </a:pPr>
-            <a:endParaRPr lang="de-AT" dirty="0"/>
-          </a:p>
-        </p:txBody>
-      </p:sp>
-      <p:pic>
-        <p:nvPicPr>
-          <p:cNvPr id="2" name="Grafik 1">
-            <a:extLst>
-              <a:ext uri="{FF2B5EF4-FFF2-40B4-BE49-F238E27FC236}">
-                <a16:creationId xmlns:a16="http://schemas.microsoft.com/office/drawing/2014/main" id="{41B713B9-5A37-4ECC-93F9-A34A56D46836}"/>
-              </a:ext>
-            </a:extLst>
-          </p:cNvPr>
-          <p:cNvPicPr>
-            <a:picLocks noChangeAspect="1"/>
-          </p:cNvPicPr>
-          <p:nvPr/>
-        </p:nvPicPr>
-        <p:blipFill rotWithShape="1">
-          <a:blip r:embed="rId2"/>
-          <a:srcRect l="18743" t="33192" r="55088" b="17678"/>
-          <a:stretch/>
-        </p:blipFill>
-        <p:spPr>
-          <a:xfrm>
-            <a:off x="6026622" y="2204864"/>
-            <a:ext cx="2796629" cy="2952000"/>
-          </a:xfrm>
-          <a:prstGeom prst="rect">
-            <a:avLst/>
-          </a:prstGeom>
-        </p:spPr>
-      </p:pic>
-    </p:spTree>
-    <p:extLst>
-      <p:ext uri="{BB962C8B-B14F-4D97-AF65-F5344CB8AC3E}">
-        <p14:creationId xmlns:p14="http://schemas.microsoft.com/office/powerpoint/2010/main" val="2389749294"/>
-      </p:ext>
-    </p:extLst>
-  </p:cSld>
-  <p:clrMapOvr>
-    <a:masterClrMapping/>
-  </p:clrMapOvr>
-</p:sld>
-</file>
-
-<file path=ppt/slides/slide5.xml><?xml version="1.0" encoding="utf-8"?>
-<p:sld xmlns:a="http://schemas.openxmlformats.org/drawingml/2006/main" xmlns:r="http://schemas.openxmlformats.org/officeDocument/2006/relationships" xmlns:p="http://schemas.openxmlformats.org/presentationml/2006/main">
-  <p:cSld>
-    <p:spTree>
-      <p:nvGrpSpPr>
-        <p:cNvPr id="1" name=""/>
-        <p:cNvGrpSpPr/>
-        <p:nvPr/>
-      </p:nvGrpSpPr>
-      <p:grpSpPr>
-        <a:xfrm>
-          <a:off x="0" y="0"/>
-          <a:ext cx="0" cy="0"/>
-          <a:chOff x="0" y="0"/>
-          <a:chExt cx="0" cy="0"/>
-        </a:xfrm>
-      </p:grpSpPr>
-      <p:sp>
-        <p:nvSpPr>
           <p:cNvPr id="2" name="Inhaltsplatzhalter 1">
             <a:extLst>
               <a:ext uri="{FF2B5EF4-FFF2-40B4-BE49-F238E27FC236}">
@@ -10069,7 +9281,7 @@
           <a:p>
             <a:fld id="{A6A55E55-235A-4F68-B44B-5B270E39D9BB}" type="datetime1">
               <a:rPr lang="de-AT" smtClean="0"/>
-              <a:t>21.01.2018</a:t>
+              <a:t>22.01.2018</a:t>
             </a:fld>
             <a:endParaRPr lang="de-AT" dirty="0"/>
           </a:p>
@@ -10127,7 +9339,7 @@
           <a:p>
             <a:fld id="{3B0692D3-3767-4542-A95D-53684A81B966}" type="slidenum">
               <a:rPr lang="de-AT" smtClean="0"/>
-              <a:t>5</a:t>
+              <a:t>3</a:t>
             </a:fld>
             <a:endParaRPr lang="de-AT" dirty="0"/>
           </a:p>
@@ -10196,7 +9408,7 @@
                   <a:schemeClr val="bg1"/>
                 </a:solidFill>
               </a:rPr>
-              <a:t>Project at a </a:t>
+              <a:t>Project </a:t>
             </a:r>
             <a:r>
               <a:rPr lang="de-DE" dirty="0" err="1">
@@ -10204,7 +9416,23 @@
                   <a:schemeClr val="bg1"/>
                 </a:solidFill>
               </a:rPr>
-              <a:t>glance</a:t>
+              <a:t>use</a:t>
+            </a:r>
+            <a:r>
+              <a:rPr lang="de-DE" dirty="0">
+                <a:solidFill>
+                  <a:schemeClr val="bg1"/>
+                </a:solidFill>
+              </a:rPr>
+              <a:t> </a:t>
+            </a:r>
+            <a:r>
+              <a:rPr lang="de-DE" dirty="0" err="1">
+                <a:solidFill>
+                  <a:schemeClr val="bg1"/>
+                </a:solidFill>
+              </a:rPr>
+              <a:t>case</a:t>
             </a:r>
             <a:endParaRPr lang="de-DE" dirty="0">
               <a:solidFill>
@@ -10214,10 +9442,990 @@
           </a:p>
         </p:txBody>
       </p:sp>
+      <p:sp>
+        <p:nvSpPr>
+          <p:cNvPr id="8" name="Textfeld 7">
+            <a:extLst>
+              <a:ext uri="{FF2B5EF4-FFF2-40B4-BE49-F238E27FC236}">
+                <a16:creationId xmlns:a16="http://schemas.microsoft.com/office/drawing/2014/main" id="{8E794ECD-7DC9-4AED-BF12-C6623322CAC4}"/>
+              </a:ext>
+            </a:extLst>
+          </p:cNvPr>
+          <p:cNvSpPr txBox="1"/>
+          <p:nvPr/>
+        </p:nvSpPr>
+        <p:spPr>
+          <a:xfrm>
+            <a:off x="1928664" y="6021288"/>
+            <a:ext cx="7103203" cy="307777"/>
+          </a:xfrm>
+          <a:prstGeom prst="rect">
+            <a:avLst/>
+          </a:prstGeom>
+          <a:noFill/>
+        </p:spPr>
+        <p:txBody>
+          <a:bodyPr wrap="square" rtlCol="0">
+            <a:spAutoFit/>
+          </a:bodyPr>
+          <a:lstStyle/>
+          <a:p>
+            <a:r>
+              <a:rPr lang="de-AT" sz="1400" dirty="0"/>
+              <a:t>Quelle: http://www.flensburger-budo-club.de/attachments/Image/team.jpg?template=generic</a:t>
+            </a:r>
+          </a:p>
+        </p:txBody>
+      </p:sp>
     </p:spTree>
     <p:extLst>
       <p:ext uri="{BB962C8B-B14F-4D97-AF65-F5344CB8AC3E}">
         <p14:creationId xmlns:p14="http://schemas.microsoft.com/office/powerpoint/2010/main" val="3589922886"/>
+      </p:ext>
+    </p:extLst>
+  </p:cSld>
+  <p:clrMapOvr>
+    <a:masterClrMapping/>
+  </p:clrMapOvr>
+</p:sld>
+</file>
+
+<file path=ppt/slides/slide4.xml><?xml version="1.0" encoding="utf-8"?>
+<p:sld xmlns:a="http://schemas.openxmlformats.org/drawingml/2006/main" xmlns:r="http://schemas.openxmlformats.org/officeDocument/2006/relationships" xmlns:p="http://schemas.openxmlformats.org/presentationml/2006/main">
+  <p:cSld>
+    <p:spTree>
+      <p:nvGrpSpPr>
+        <p:cNvPr id="1" name=""/>
+        <p:cNvGrpSpPr/>
+        <p:nvPr/>
+      </p:nvGrpSpPr>
+      <p:grpSpPr>
+        <a:xfrm>
+          <a:off x="0" y="0"/>
+          <a:ext cx="0" cy="0"/>
+          <a:chOff x="0" y="0"/>
+          <a:chExt cx="0" cy="0"/>
+        </a:xfrm>
+      </p:grpSpPr>
+      <p:sp>
+        <p:nvSpPr>
+          <p:cNvPr id="8" name="Titel 7">
+            <a:extLst>
+              <a:ext uri="{FF2B5EF4-FFF2-40B4-BE49-F238E27FC236}">
+                <a16:creationId xmlns:a16="http://schemas.microsoft.com/office/drawing/2014/main" id="{B4C15081-4C46-4C61-946B-BAC305253743}"/>
+              </a:ext>
+            </a:extLst>
+          </p:cNvPr>
+          <p:cNvSpPr>
+            <a:spLocks noGrp="1"/>
+          </p:cNvSpPr>
+          <p:nvPr>
+            <p:ph type="title" idx="4294967295"/>
+          </p:nvPr>
+        </p:nvSpPr>
+        <p:spPr>
+          <a:xfrm>
+            <a:off x="116467" y="116632"/>
+            <a:ext cx="8915400" cy="1143000"/>
+          </a:xfrm>
+        </p:spPr>
+        <p:txBody>
+          <a:bodyPr>
+            <a:normAutofit/>
+          </a:bodyPr>
+          <a:lstStyle/>
+          <a:p>
+            <a:r>
+              <a:rPr lang="de-DE" dirty="0">
+                <a:solidFill>
+                  <a:schemeClr val="bg1"/>
+                </a:solidFill>
+              </a:rPr>
+              <a:t>Project </a:t>
+            </a:r>
+            <a:r>
+              <a:rPr lang="de-DE" dirty="0" err="1">
+                <a:solidFill>
+                  <a:schemeClr val="bg1"/>
+                </a:solidFill>
+              </a:rPr>
+              <a:t>use</a:t>
+            </a:r>
+            <a:r>
+              <a:rPr lang="de-DE" dirty="0">
+                <a:solidFill>
+                  <a:schemeClr val="bg1"/>
+                </a:solidFill>
+              </a:rPr>
+              <a:t> </a:t>
+            </a:r>
+            <a:r>
+              <a:rPr lang="de-DE" dirty="0" err="1">
+                <a:solidFill>
+                  <a:schemeClr val="bg1"/>
+                </a:solidFill>
+              </a:rPr>
+              <a:t>case</a:t>
+            </a:r>
+            <a:endParaRPr lang="de-DE" dirty="0">
+              <a:solidFill>
+                <a:schemeClr val="bg1"/>
+              </a:solidFill>
+            </a:endParaRPr>
+          </a:p>
+        </p:txBody>
+      </p:sp>
+      <p:sp>
+        <p:nvSpPr>
+          <p:cNvPr id="4" name="Datumsplatzhalter 3">
+            <a:extLst>
+              <a:ext uri="{FF2B5EF4-FFF2-40B4-BE49-F238E27FC236}">
+                <a16:creationId xmlns:a16="http://schemas.microsoft.com/office/drawing/2014/main" id="{82014930-B991-4842-9356-CB5C23CCA0DD}"/>
+              </a:ext>
+            </a:extLst>
+          </p:cNvPr>
+          <p:cNvSpPr>
+            <a:spLocks noGrp="1"/>
+          </p:cNvSpPr>
+          <p:nvPr>
+            <p:ph type="dt" sz="half" idx="10"/>
+          </p:nvPr>
+        </p:nvSpPr>
+        <p:spPr/>
+        <p:txBody>
+          <a:bodyPr/>
+          <a:lstStyle/>
+          <a:p>
+            <a:fld id="{A6A55E55-235A-4F68-B44B-5B270E39D9BB}" type="datetime1">
+              <a:rPr lang="de-AT" smtClean="0"/>
+              <a:t>22.01.2018</a:t>
+            </a:fld>
+            <a:endParaRPr lang="de-AT" dirty="0"/>
+          </a:p>
+        </p:txBody>
+      </p:sp>
+      <p:sp>
+        <p:nvSpPr>
+          <p:cNvPr id="5" name="Fußzeilenplatzhalter 4">
+            <a:extLst>
+              <a:ext uri="{FF2B5EF4-FFF2-40B4-BE49-F238E27FC236}">
+                <a16:creationId xmlns:a16="http://schemas.microsoft.com/office/drawing/2014/main" id="{C6F28DD9-7E24-4860-A748-0423524A91F2}"/>
+              </a:ext>
+            </a:extLst>
+          </p:cNvPr>
+          <p:cNvSpPr>
+            <a:spLocks noGrp="1"/>
+          </p:cNvSpPr>
+          <p:nvPr>
+            <p:ph type="ftr" sz="quarter" idx="11"/>
+          </p:nvPr>
+        </p:nvSpPr>
+        <p:spPr/>
+        <p:txBody>
+          <a:bodyPr/>
+          <a:lstStyle/>
+          <a:p>
+            <a:r>
+              <a:rPr lang="de-AT" dirty="0"/>
+              <a:t>Project Management Methods - "Mars Expedition"</a:t>
+            </a:r>
+          </a:p>
+        </p:txBody>
+      </p:sp>
+      <p:sp>
+        <p:nvSpPr>
+          <p:cNvPr id="6" name="Foliennummernplatzhalter 5">
+            <a:extLst>
+              <a:ext uri="{FF2B5EF4-FFF2-40B4-BE49-F238E27FC236}">
+                <a16:creationId xmlns:a16="http://schemas.microsoft.com/office/drawing/2014/main" id="{74388B65-7CD4-4103-AFA7-148FA1E04B84}"/>
+              </a:ext>
+            </a:extLst>
+          </p:cNvPr>
+          <p:cNvSpPr>
+            <a:spLocks noGrp="1"/>
+          </p:cNvSpPr>
+          <p:nvPr>
+            <p:ph type="sldNum" sz="quarter" idx="12"/>
+          </p:nvPr>
+        </p:nvSpPr>
+        <p:spPr/>
+        <p:txBody>
+          <a:bodyPr/>
+          <a:lstStyle/>
+          <a:p>
+            <a:fld id="{3B0692D3-3767-4542-A95D-53684A81B966}" type="slidenum">
+              <a:rPr lang="de-AT" smtClean="0"/>
+              <a:t>4</a:t>
+            </a:fld>
+            <a:endParaRPr lang="de-AT" dirty="0"/>
+          </a:p>
+        </p:txBody>
+      </p:sp>
+      <p:sp>
+        <p:nvSpPr>
+          <p:cNvPr id="7" name="Inhaltsplatzhalter 6">
+            <a:extLst>
+              <a:ext uri="{FF2B5EF4-FFF2-40B4-BE49-F238E27FC236}">
+                <a16:creationId xmlns:a16="http://schemas.microsoft.com/office/drawing/2014/main" id="{7E34B61F-2172-4281-AC62-588A00022539}"/>
+              </a:ext>
+            </a:extLst>
+          </p:cNvPr>
+          <p:cNvSpPr>
+            <a:spLocks noGrp="1"/>
+          </p:cNvSpPr>
+          <p:nvPr>
+            <p:ph idx="1"/>
+          </p:nvPr>
+        </p:nvSpPr>
+        <p:spPr/>
+        <p:txBody>
+          <a:bodyPr>
+            <a:normAutofit/>
+          </a:bodyPr>
+          <a:lstStyle/>
+          <a:p>
+            <a:pPr marL="0" indent="0">
+              <a:lnSpc>
+                <a:spcPct val="150000"/>
+              </a:lnSpc>
+              <a:buNone/>
+            </a:pPr>
+            <a:r>
+              <a:rPr lang="en-GB" sz="1800" b="1" dirty="0">
+                <a:latin typeface="+mn-lt"/>
+                <a:ea typeface="+mn-ea"/>
+                <a:cs typeface="+mn-cs"/>
+              </a:rPr>
+              <a:t>Phase planning</a:t>
+            </a:r>
+          </a:p>
+          <a:p>
+            <a:pPr lvl="1">
+              <a:lnSpc>
+                <a:spcPct val="150000"/>
+              </a:lnSpc>
+              <a:buFont typeface="Wingdings" panose="05000000000000000000" pitchFamily="2" charset="2"/>
+              <a:buChar char="Ø"/>
+            </a:pPr>
+            <a:r>
+              <a:rPr lang="en-GB" sz="1600" dirty="0">
+                <a:latin typeface="+mn-lt"/>
+                <a:ea typeface="+mn-ea"/>
+                <a:cs typeface="+mn-cs"/>
+              </a:rPr>
+              <a:t>Conception phase</a:t>
+            </a:r>
+          </a:p>
+          <a:p>
+            <a:pPr lvl="1">
+              <a:lnSpc>
+                <a:spcPct val="150000"/>
+              </a:lnSpc>
+              <a:buFont typeface="Wingdings" panose="05000000000000000000" pitchFamily="2" charset="2"/>
+              <a:buChar char="Ø"/>
+            </a:pPr>
+            <a:r>
+              <a:rPr lang="en-GB" sz="1600" dirty="0">
+                <a:latin typeface="+mn-lt"/>
+                <a:ea typeface="+mn-ea"/>
+                <a:cs typeface="+mn-cs"/>
+              </a:rPr>
+              <a:t>Define and Planning phase</a:t>
+            </a:r>
+          </a:p>
+          <a:p>
+            <a:pPr lvl="1">
+              <a:lnSpc>
+                <a:spcPct val="150000"/>
+              </a:lnSpc>
+              <a:buFont typeface="Wingdings" panose="05000000000000000000" pitchFamily="2" charset="2"/>
+              <a:buChar char="Ø"/>
+            </a:pPr>
+            <a:r>
+              <a:rPr lang="en-GB" sz="1600" dirty="0">
+                <a:latin typeface="+mn-lt"/>
+                <a:ea typeface="+mn-ea"/>
+                <a:cs typeface="+mn-cs"/>
+              </a:rPr>
+              <a:t>Execution Phase</a:t>
+            </a:r>
+          </a:p>
+          <a:p>
+            <a:pPr lvl="1">
+              <a:lnSpc>
+                <a:spcPct val="150000"/>
+              </a:lnSpc>
+              <a:buFont typeface="Wingdings" panose="05000000000000000000" pitchFamily="2" charset="2"/>
+              <a:buChar char="Ø"/>
+            </a:pPr>
+            <a:r>
+              <a:rPr lang="en-GB" sz="1600" dirty="0">
+                <a:latin typeface="+mn-lt"/>
+                <a:ea typeface="+mn-ea"/>
+                <a:cs typeface="+mn-cs"/>
+              </a:rPr>
+              <a:t>Closing Phase (Mars Landing)</a:t>
+            </a:r>
+          </a:p>
+          <a:p>
+            <a:pPr lvl="1">
+              <a:lnSpc>
+                <a:spcPct val="150000"/>
+              </a:lnSpc>
+              <a:buFont typeface="Wingdings" panose="05000000000000000000" pitchFamily="2" charset="2"/>
+              <a:buChar char="Ø"/>
+            </a:pPr>
+            <a:endParaRPr lang="en-GB" sz="1400" dirty="0">
+              <a:latin typeface="+mn-lt"/>
+              <a:ea typeface="+mn-ea"/>
+              <a:cs typeface="+mn-cs"/>
+            </a:endParaRPr>
+          </a:p>
+          <a:p>
+            <a:pPr marL="342108" lvl="1" indent="-285750">
+              <a:lnSpc>
+                <a:spcPct val="150000"/>
+              </a:lnSpc>
+              <a:buFont typeface="Wingdings" panose="05000000000000000000" pitchFamily="2" charset="2"/>
+              <a:buChar char="Ø"/>
+            </a:pPr>
+            <a:r>
+              <a:rPr lang="en-GB" sz="1800" dirty="0">
+                <a:latin typeface="+mn-lt"/>
+                <a:ea typeface="+mn-ea"/>
+                <a:cs typeface="+mn-cs"/>
+              </a:rPr>
+              <a:t>Structure</a:t>
+            </a:r>
+          </a:p>
+          <a:p>
+            <a:pPr marL="342108" lvl="1" indent="-285750">
+              <a:lnSpc>
+                <a:spcPct val="150000"/>
+              </a:lnSpc>
+              <a:buFont typeface="Wingdings" panose="05000000000000000000" pitchFamily="2" charset="2"/>
+              <a:buChar char="Ø"/>
+            </a:pPr>
+            <a:r>
+              <a:rPr lang="en-GB" sz="1800" dirty="0">
+                <a:latin typeface="+mn-lt"/>
+                <a:ea typeface="+mn-ea"/>
+                <a:cs typeface="+mn-cs"/>
+              </a:rPr>
+              <a:t>Set up activities</a:t>
+            </a:r>
+          </a:p>
+          <a:p>
+            <a:pPr marL="342000" lvl="1">
+              <a:lnSpc>
+                <a:spcPct val="150000"/>
+              </a:lnSpc>
+              <a:buFont typeface="Wingdings" panose="05000000000000000000" pitchFamily="2" charset="2"/>
+              <a:buChar char="Ø"/>
+            </a:pPr>
+            <a:r>
+              <a:rPr lang="en-GB" sz="1800" dirty="0">
+                <a:latin typeface="+mn-lt"/>
+                <a:ea typeface="+mn-ea"/>
+                <a:cs typeface="+mn-cs"/>
+              </a:rPr>
+              <a:t>Work step by step</a:t>
+            </a:r>
+          </a:p>
+          <a:p>
+            <a:pPr marL="457028" lvl="1" indent="0">
+              <a:lnSpc>
+                <a:spcPct val="150000"/>
+              </a:lnSpc>
+              <a:buNone/>
+            </a:pPr>
+            <a:endParaRPr lang="de-AT" sz="1400" dirty="0">
+              <a:latin typeface="+mn-lt"/>
+              <a:ea typeface="+mn-ea"/>
+              <a:cs typeface="+mn-cs"/>
+            </a:endParaRPr>
+          </a:p>
+          <a:p>
+            <a:pPr lvl="1">
+              <a:buFont typeface="Wingdings" panose="05000000000000000000" pitchFamily="2" charset="2"/>
+              <a:buChar char="Ø"/>
+            </a:pPr>
+            <a:endParaRPr lang="de-AT" sz="1400" dirty="0">
+              <a:latin typeface="+mn-lt"/>
+              <a:ea typeface="+mn-ea"/>
+              <a:cs typeface="+mn-cs"/>
+            </a:endParaRPr>
+          </a:p>
+          <a:p>
+            <a:pPr marL="457028" lvl="1" indent="0">
+              <a:buNone/>
+            </a:pPr>
+            <a:endParaRPr lang="de-AT" sz="1400" dirty="0">
+              <a:latin typeface="+mn-lt"/>
+              <a:ea typeface="+mn-ea"/>
+              <a:cs typeface="+mn-cs"/>
+            </a:endParaRPr>
+          </a:p>
+          <a:p>
+            <a:pPr lvl="1">
+              <a:buFont typeface="Wingdings" panose="05000000000000000000" pitchFamily="2" charset="2"/>
+              <a:buChar char="Ø"/>
+            </a:pPr>
+            <a:endParaRPr lang="de-AT" dirty="0"/>
+          </a:p>
+        </p:txBody>
+      </p:sp>
+      <p:pic>
+        <p:nvPicPr>
+          <p:cNvPr id="9" name="Grafik 8">
+            <a:extLst>
+              <a:ext uri="{FF2B5EF4-FFF2-40B4-BE49-F238E27FC236}">
+                <a16:creationId xmlns:a16="http://schemas.microsoft.com/office/drawing/2014/main" id="{B2140789-E50F-4DF1-847E-D0E963506754}"/>
+              </a:ext>
+            </a:extLst>
+          </p:cNvPr>
+          <p:cNvPicPr>
+            <a:picLocks noChangeAspect="1"/>
+          </p:cNvPicPr>
+          <p:nvPr/>
+        </p:nvPicPr>
+        <p:blipFill rotWithShape="1">
+          <a:blip r:embed="rId3"/>
+          <a:srcRect l="24803" t="47414" r="60904" b="28021"/>
+          <a:stretch/>
+        </p:blipFill>
+        <p:spPr>
+          <a:xfrm>
+            <a:off x="5313040" y="2591624"/>
+            <a:ext cx="2458939" cy="2376000"/>
+          </a:xfrm>
+          <a:prstGeom prst="rect">
+            <a:avLst/>
+          </a:prstGeom>
+        </p:spPr>
+      </p:pic>
+      <p:sp>
+        <p:nvSpPr>
+          <p:cNvPr id="2" name="Textfeld 1">
+            <a:extLst>
+              <a:ext uri="{FF2B5EF4-FFF2-40B4-BE49-F238E27FC236}">
+                <a16:creationId xmlns:a16="http://schemas.microsoft.com/office/drawing/2014/main" id="{A0090D94-8488-4D9C-80B3-EF6C6566BF25}"/>
+              </a:ext>
+            </a:extLst>
+          </p:cNvPr>
+          <p:cNvSpPr txBox="1"/>
+          <p:nvPr/>
+        </p:nvSpPr>
+        <p:spPr>
+          <a:xfrm>
+            <a:off x="4223057" y="6021288"/>
+            <a:ext cx="4808810" cy="307777"/>
+          </a:xfrm>
+          <a:prstGeom prst="rect">
+            <a:avLst/>
+          </a:prstGeom>
+          <a:noFill/>
+        </p:spPr>
+        <p:txBody>
+          <a:bodyPr wrap="square" rtlCol="0">
+            <a:spAutoFit/>
+          </a:bodyPr>
+          <a:lstStyle/>
+          <a:p>
+            <a:r>
+              <a:rPr lang="de-AT" sz="1400" dirty="0"/>
+              <a:t>Quelle: http://www.mpmm.com/images/pmbok-processes.jpg</a:t>
+            </a:r>
+          </a:p>
+        </p:txBody>
+      </p:sp>
+    </p:spTree>
+    <p:extLst>
+      <p:ext uri="{BB962C8B-B14F-4D97-AF65-F5344CB8AC3E}">
+        <p14:creationId xmlns:p14="http://schemas.microsoft.com/office/powerpoint/2010/main" val="2739111897"/>
+      </p:ext>
+    </p:extLst>
+  </p:cSld>
+  <p:clrMapOvr>
+    <a:masterClrMapping/>
+  </p:clrMapOvr>
+</p:sld>
+</file>
+
+<file path=ppt/slides/slide5.xml><?xml version="1.0" encoding="utf-8"?>
+<p:sld xmlns:a="http://schemas.openxmlformats.org/drawingml/2006/main" xmlns:r="http://schemas.openxmlformats.org/officeDocument/2006/relationships" xmlns:p="http://schemas.openxmlformats.org/presentationml/2006/main">
+  <p:cSld>
+    <p:spTree>
+      <p:nvGrpSpPr>
+        <p:cNvPr id="1" name=""/>
+        <p:cNvGrpSpPr/>
+        <p:nvPr/>
+      </p:nvGrpSpPr>
+      <p:grpSpPr>
+        <a:xfrm>
+          <a:off x="0" y="0"/>
+          <a:ext cx="0" cy="0"/>
+          <a:chOff x="0" y="0"/>
+          <a:chExt cx="0" cy="0"/>
+        </a:xfrm>
+      </p:grpSpPr>
+      <p:sp>
+        <p:nvSpPr>
+          <p:cNvPr id="8" name="Titel 7">
+            <a:extLst>
+              <a:ext uri="{FF2B5EF4-FFF2-40B4-BE49-F238E27FC236}">
+                <a16:creationId xmlns:a16="http://schemas.microsoft.com/office/drawing/2014/main" id="{B4C15081-4C46-4C61-946B-BAC305253743}"/>
+              </a:ext>
+            </a:extLst>
+          </p:cNvPr>
+          <p:cNvSpPr>
+            <a:spLocks noGrp="1"/>
+          </p:cNvSpPr>
+          <p:nvPr>
+            <p:ph type="title" idx="4294967295"/>
+          </p:nvPr>
+        </p:nvSpPr>
+        <p:spPr>
+          <a:xfrm>
+            <a:off x="116467" y="116632"/>
+            <a:ext cx="8915400" cy="1143000"/>
+          </a:xfrm>
+        </p:spPr>
+        <p:txBody>
+          <a:bodyPr>
+            <a:normAutofit/>
+          </a:bodyPr>
+          <a:lstStyle/>
+          <a:p>
+            <a:r>
+              <a:rPr lang="de-DE" dirty="0">
+                <a:solidFill>
+                  <a:schemeClr val="bg1"/>
+                </a:solidFill>
+              </a:rPr>
+              <a:t>Project </a:t>
+            </a:r>
+            <a:r>
+              <a:rPr lang="de-DE" dirty="0" err="1">
+                <a:solidFill>
+                  <a:schemeClr val="bg1"/>
+                </a:solidFill>
+              </a:rPr>
+              <a:t>use</a:t>
+            </a:r>
+            <a:r>
+              <a:rPr lang="de-DE" dirty="0">
+                <a:solidFill>
+                  <a:schemeClr val="bg1"/>
+                </a:solidFill>
+              </a:rPr>
+              <a:t> </a:t>
+            </a:r>
+            <a:r>
+              <a:rPr lang="de-DE" dirty="0" err="1">
+                <a:solidFill>
+                  <a:schemeClr val="bg1"/>
+                </a:solidFill>
+              </a:rPr>
+              <a:t>case</a:t>
+            </a:r>
+            <a:endParaRPr lang="de-DE" dirty="0">
+              <a:solidFill>
+                <a:schemeClr val="bg1"/>
+              </a:solidFill>
+            </a:endParaRPr>
+          </a:p>
+        </p:txBody>
+      </p:sp>
+      <p:sp>
+        <p:nvSpPr>
+          <p:cNvPr id="4" name="Datumsplatzhalter 3">
+            <a:extLst>
+              <a:ext uri="{FF2B5EF4-FFF2-40B4-BE49-F238E27FC236}">
+                <a16:creationId xmlns:a16="http://schemas.microsoft.com/office/drawing/2014/main" id="{82014930-B991-4842-9356-CB5C23CCA0DD}"/>
+              </a:ext>
+            </a:extLst>
+          </p:cNvPr>
+          <p:cNvSpPr>
+            <a:spLocks noGrp="1"/>
+          </p:cNvSpPr>
+          <p:nvPr>
+            <p:ph type="dt" sz="half" idx="10"/>
+          </p:nvPr>
+        </p:nvSpPr>
+        <p:spPr/>
+        <p:txBody>
+          <a:bodyPr/>
+          <a:lstStyle/>
+          <a:p>
+            <a:fld id="{A6A55E55-235A-4F68-B44B-5B270E39D9BB}" type="datetime1">
+              <a:rPr lang="de-AT" smtClean="0"/>
+              <a:t>22.01.2018</a:t>
+            </a:fld>
+            <a:endParaRPr lang="de-AT" dirty="0"/>
+          </a:p>
+        </p:txBody>
+      </p:sp>
+      <p:sp>
+        <p:nvSpPr>
+          <p:cNvPr id="5" name="Fußzeilenplatzhalter 4">
+            <a:extLst>
+              <a:ext uri="{FF2B5EF4-FFF2-40B4-BE49-F238E27FC236}">
+                <a16:creationId xmlns:a16="http://schemas.microsoft.com/office/drawing/2014/main" id="{C6F28DD9-7E24-4860-A748-0423524A91F2}"/>
+              </a:ext>
+            </a:extLst>
+          </p:cNvPr>
+          <p:cNvSpPr>
+            <a:spLocks noGrp="1"/>
+          </p:cNvSpPr>
+          <p:nvPr>
+            <p:ph type="ftr" sz="quarter" idx="11"/>
+          </p:nvPr>
+        </p:nvSpPr>
+        <p:spPr/>
+        <p:txBody>
+          <a:bodyPr/>
+          <a:lstStyle/>
+          <a:p>
+            <a:r>
+              <a:rPr lang="de-AT"/>
+              <a:t>Project Management Methods - "Mars Expedition"</a:t>
+            </a:r>
+            <a:endParaRPr lang="de-AT" dirty="0"/>
+          </a:p>
+        </p:txBody>
+      </p:sp>
+      <p:sp>
+        <p:nvSpPr>
+          <p:cNvPr id="6" name="Foliennummernplatzhalter 5">
+            <a:extLst>
+              <a:ext uri="{FF2B5EF4-FFF2-40B4-BE49-F238E27FC236}">
+                <a16:creationId xmlns:a16="http://schemas.microsoft.com/office/drawing/2014/main" id="{74388B65-7CD4-4103-AFA7-148FA1E04B84}"/>
+              </a:ext>
+            </a:extLst>
+          </p:cNvPr>
+          <p:cNvSpPr>
+            <a:spLocks noGrp="1"/>
+          </p:cNvSpPr>
+          <p:nvPr>
+            <p:ph type="sldNum" sz="quarter" idx="12"/>
+          </p:nvPr>
+        </p:nvSpPr>
+        <p:spPr/>
+        <p:txBody>
+          <a:bodyPr/>
+          <a:lstStyle/>
+          <a:p>
+            <a:fld id="{3B0692D3-3767-4542-A95D-53684A81B966}" type="slidenum">
+              <a:rPr lang="de-AT" smtClean="0"/>
+              <a:t>5</a:t>
+            </a:fld>
+            <a:endParaRPr lang="de-AT" dirty="0"/>
+          </a:p>
+        </p:txBody>
+      </p:sp>
+      <p:sp>
+        <p:nvSpPr>
+          <p:cNvPr id="7" name="Inhaltsplatzhalter 6">
+            <a:extLst>
+              <a:ext uri="{FF2B5EF4-FFF2-40B4-BE49-F238E27FC236}">
+                <a16:creationId xmlns:a16="http://schemas.microsoft.com/office/drawing/2014/main" id="{7E34B61F-2172-4281-AC62-588A00022539}"/>
+              </a:ext>
+            </a:extLst>
+          </p:cNvPr>
+          <p:cNvSpPr>
+            <a:spLocks noGrp="1"/>
+          </p:cNvSpPr>
+          <p:nvPr>
+            <p:ph idx="1"/>
+          </p:nvPr>
+        </p:nvSpPr>
+        <p:spPr>
+          <a:xfrm>
+            <a:off x="495300" y="1412776"/>
+            <a:ext cx="8915400" cy="4713393"/>
+          </a:xfrm>
+        </p:spPr>
+        <p:txBody>
+          <a:bodyPr>
+            <a:normAutofit/>
+          </a:bodyPr>
+          <a:lstStyle/>
+          <a:p>
+            <a:pPr marL="0" lvl="1" indent="0">
+              <a:lnSpc>
+                <a:spcPct val="150000"/>
+              </a:lnSpc>
+              <a:buNone/>
+            </a:pPr>
+            <a:r>
+              <a:rPr lang="en-GB" sz="1800" b="1" dirty="0">
+                <a:latin typeface="+mn-lt"/>
+                <a:ea typeface="+mn-ea"/>
+                <a:cs typeface="+mn-cs"/>
+              </a:rPr>
+              <a:t>Milestones</a:t>
+            </a:r>
+          </a:p>
+          <a:p>
+            <a:pPr lvl="1">
+              <a:lnSpc>
+                <a:spcPct val="150000"/>
+              </a:lnSpc>
+              <a:buFont typeface="Wingdings" panose="05000000000000000000" pitchFamily="2" charset="2"/>
+              <a:buChar char="Ø"/>
+            </a:pPr>
+            <a:r>
+              <a:rPr lang="en-GB" sz="1600" dirty="0">
+                <a:latin typeface="+mn-lt"/>
+                <a:ea typeface="+mn-ea"/>
+                <a:cs typeface="+mn-cs"/>
+              </a:rPr>
+              <a:t>1st: Structure, basic concept, distribution of roles</a:t>
+            </a:r>
+          </a:p>
+          <a:p>
+            <a:pPr lvl="1">
+              <a:lnSpc>
+                <a:spcPct val="150000"/>
+              </a:lnSpc>
+              <a:buFont typeface="Wingdings" panose="05000000000000000000" pitchFamily="2" charset="2"/>
+              <a:buChar char="Ø"/>
+            </a:pPr>
+            <a:r>
+              <a:rPr lang="en-GB" sz="1600" dirty="0">
+                <a:latin typeface="+mn-lt"/>
+                <a:ea typeface="+mn-ea"/>
+                <a:cs typeface="+mn-cs"/>
+              </a:rPr>
+              <a:t>2nd: Prototyping our  </a:t>
+            </a:r>
+            <a:r>
+              <a:rPr lang="en-GB" sz="1600" dirty="0" err="1">
+                <a:latin typeface="+mn-lt"/>
+                <a:ea typeface="+mn-ea"/>
+                <a:cs typeface="+mn-cs"/>
+              </a:rPr>
+              <a:t>Mohne</a:t>
+            </a:r>
+            <a:endParaRPr lang="en-GB" sz="1600" dirty="0">
+              <a:latin typeface="+mn-lt"/>
+              <a:ea typeface="+mn-ea"/>
+              <a:cs typeface="+mn-cs"/>
+            </a:endParaRPr>
+          </a:p>
+          <a:p>
+            <a:pPr lvl="1">
+              <a:lnSpc>
+                <a:spcPct val="150000"/>
+              </a:lnSpc>
+              <a:buFont typeface="Wingdings" panose="05000000000000000000" pitchFamily="2" charset="2"/>
+              <a:buChar char="Ø"/>
+            </a:pPr>
+            <a:r>
+              <a:rPr lang="en-GB" sz="1600" dirty="0">
+                <a:latin typeface="+mn-lt"/>
+                <a:ea typeface="+mn-ea"/>
+                <a:cs typeface="+mn-cs"/>
+              </a:rPr>
+              <a:t>3rd: Optimization for our finalisation phase</a:t>
+            </a:r>
+          </a:p>
+          <a:p>
+            <a:pPr lvl="1">
+              <a:lnSpc>
+                <a:spcPct val="150000"/>
+              </a:lnSpc>
+              <a:buFont typeface="Wingdings" panose="05000000000000000000" pitchFamily="2" charset="2"/>
+              <a:buChar char="Ø"/>
+            </a:pPr>
+            <a:endParaRPr lang="en-GB" sz="1600" dirty="0">
+              <a:latin typeface="+mn-lt"/>
+              <a:ea typeface="+mn-ea"/>
+              <a:cs typeface="+mn-cs"/>
+            </a:endParaRPr>
+          </a:p>
+          <a:p>
+            <a:pPr marL="342108" lvl="1" indent="-285750">
+              <a:lnSpc>
+                <a:spcPct val="150000"/>
+              </a:lnSpc>
+              <a:buFont typeface="Wingdings" panose="05000000000000000000" pitchFamily="2" charset="2"/>
+              <a:buChar char="Ø"/>
+            </a:pPr>
+            <a:r>
+              <a:rPr lang="en-GB" sz="1800" dirty="0">
+                <a:latin typeface="+mn-lt"/>
+                <a:ea typeface="+mn-ea"/>
+                <a:cs typeface="+mn-cs"/>
+              </a:rPr>
+              <a:t>Control project progression</a:t>
+            </a:r>
+          </a:p>
+          <a:p>
+            <a:pPr marL="342108" lvl="1" indent="-285750">
+              <a:lnSpc>
+                <a:spcPct val="150000"/>
+              </a:lnSpc>
+              <a:buFont typeface="Wingdings" panose="05000000000000000000" pitchFamily="2" charset="2"/>
+              <a:buChar char="Ø"/>
+            </a:pPr>
+            <a:r>
+              <a:rPr lang="en-GB" sz="1800" dirty="0">
+                <a:latin typeface="+mn-lt"/>
+                <a:ea typeface="+mn-ea"/>
+                <a:cs typeface="+mn-cs"/>
+              </a:rPr>
+              <a:t>Relief project planning</a:t>
+            </a:r>
+          </a:p>
+          <a:p>
+            <a:pPr marL="56358" lvl="1" indent="0">
+              <a:lnSpc>
+                <a:spcPct val="150000"/>
+              </a:lnSpc>
+              <a:buNone/>
+            </a:pPr>
+            <a:endParaRPr lang="en-GB" sz="1800" dirty="0">
+              <a:latin typeface="+mn-lt"/>
+              <a:ea typeface="+mn-ea"/>
+              <a:cs typeface="+mn-cs"/>
+            </a:endParaRPr>
+          </a:p>
+          <a:p>
+            <a:pPr lvl="1">
+              <a:lnSpc>
+                <a:spcPct val="150000"/>
+              </a:lnSpc>
+              <a:buFont typeface="Wingdings" panose="05000000000000000000" pitchFamily="2" charset="2"/>
+              <a:buChar char="Ø"/>
+            </a:pPr>
+            <a:endParaRPr lang="en-GB" sz="1600" dirty="0">
+              <a:latin typeface="+mn-lt"/>
+              <a:ea typeface="+mn-ea"/>
+              <a:cs typeface="+mn-cs"/>
+            </a:endParaRPr>
+          </a:p>
+          <a:p>
+            <a:pPr marL="342770" lvl="1" indent="-342770">
+              <a:buFont typeface="Wingdings" panose="05000000000000000000" pitchFamily="2" charset="2"/>
+              <a:buChar char="Ø"/>
+            </a:pPr>
+            <a:endParaRPr lang="de-AT" sz="1800" dirty="0">
+              <a:latin typeface="+mn-lt"/>
+              <a:ea typeface="+mn-ea"/>
+              <a:cs typeface="+mn-cs"/>
+            </a:endParaRPr>
+          </a:p>
+          <a:p>
+            <a:pPr lvl="1">
+              <a:buFont typeface="Wingdings" panose="05000000000000000000" pitchFamily="2" charset="2"/>
+              <a:buChar char="Ø"/>
+            </a:pPr>
+            <a:endParaRPr lang="de-AT" sz="1400" dirty="0">
+              <a:latin typeface="+mn-lt"/>
+              <a:ea typeface="+mn-ea"/>
+              <a:cs typeface="+mn-cs"/>
+            </a:endParaRPr>
+          </a:p>
+          <a:p>
+            <a:pPr lvl="1">
+              <a:buFont typeface="Wingdings" panose="05000000000000000000" pitchFamily="2" charset="2"/>
+              <a:buChar char="Ø"/>
+            </a:pPr>
+            <a:endParaRPr lang="de-AT" sz="1400" dirty="0">
+              <a:latin typeface="+mn-lt"/>
+              <a:ea typeface="+mn-ea"/>
+              <a:cs typeface="+mn-cs"/>
+            </a:endParaRPr>
+          </a:p>
+          <a:p>
+            <a:pPr marL="457028" lvl="1" indent="0">
+              <a:buNone/>
+            </a:pPr>
+            <a:endParaRPr lang="de-AT" sz="1400" dirty="0">
+              <a:latin typeface="+mn-lt"/>
+              <a:ea typeface="+mn-ea"/>
+              <a:cs typeface="+mn-cs"/>
+            </a:endParaRPr>
+          </a:p>
+          <a:p>
+            <a:pPr lvl="1">
+              <a:buFont typeface="Wingdings" panose="05000000000000000000" pitchFamily="2" charset="2"/>
+              <a:buChar char="Ø"/>
+            </a:pPr>
+            <a:endParaRPr lang="de-AT" dirty="0"/>
+          </a:p>
+        </p:txBody>
+      </p:sp>
+      <p:pic>
+        <p:nvPicPr>
+          <p:cNvPr id="2" name="Grafik 1">
+            <a:extLst>
+              <a:ext uri="{FF2B5EF4-FFF2-40B4-BE49-F238E27FC236}">
+                <a16:creationId xmlns:a16="http://schemas.microsoft.com/office/drawing/2014/main" id="{41B713B9-5A37-4ECC-93F9-A34A56D46836}"/>
+              </a:ext>
+            </a:extLst>
+          </p:cNvPr>
+          <p:cNvPicPr>
+            <a:picLocks noChangeAspect="1"/>
+          </p:cNvPicPr>
+          <p:nvPr/>
+        </p:nvPicPr>
+        <p:blipFill rotWithShape="1">
+          <a:blip r:embed="rId2"/>
+          <a:srcRect l="18743" t="33192" r="56266" b="17678"/>
+          <a:stretch/>
+        </p:blipFill>
+        <p:spPr>
+          <a:xfrm>
+            <a:off x="6026623" y="2204864"/>
+            <a:ext cx="2670794" cy="2952000"/>
+          </a:xfrm>
+          <a:prstGeom prst="rect">
+            <a:avLst/>
+          </a:prstGeom>
+        </p:spPr>
+      </p:pic>
+      <p:sp>
+        <p:nvSpPr>
+          <p:cNvPr id="9" name="Textfeld 8">
+            <a:extLst>
+              <a:ext uri="{FF2B5EF4-FFF2-40B4-BE49-F238E27FC236}">
+                <a16:creationId xmlns:a16="http://schemas.microsoft.com/office/drawing/2014/main" id="{1C84AF23-BB6A-4A30-854B-A49F5AB24153}"/>
+              </a:ext>
+            </a:extLst>
+          </p:cNvPr>
+          <p:cNvSpPr txBox="1"/>
+          <p:nvPr/>
+        </p:nvSpPr>
+        <p:spPr>
+          <a:xfrm>
+            <a:off x="4223057" y="6021288"/>
+            <a:ext cx="4808810" cy="307777"/>
+          </a:xfrm>
+          <a:prstGeom prst="rect">
+            <a:avLst/>
+          </a:prstGeom>
+          <a:noFill/>
+        </p:spPr>
+        <p:txBody>
+          <a:bodyPr wrap="square" rtlCol="0">
+            <a:spAutoFit/>
+          </a:bodyPr>
+          <a:lstStyle/>
+          <a:p>
+            <a:r>
+              <a:rPr lang="de-AT" sz="1400" dirty="0"/>
+              <a:t>Quelle: http://laoblogger.com/images/milestone-clipart-10.jpg</a:t>
+            </a:r>
+          </a:p>
+        </p:txBody>
+      </p:sp>
+    </p:spTree>
+    <p:extLst>
+      <p:ext uri="{BB962C8B-B14F-4D97-AF65-F5344CB8AC3E}">
+        <p14:creationId xmlns:p14="http://schemas.microsoft.com/office/powerpoint/2010/main" val="2389749294"/>
       </p:ext>
     </p:extLst>
   </p:cSld>
@@ -10267,8 +10475,8 @@
         </p:blipFill>
         <p:spPr>
           <a:xfrm>
-            <a:off x="414427" y="1791000"/>
-            <a:ext cx="9032756" cy="3996000"/>
+            <a:off x="111118" y="1293548"/>
+            <a:ext cx="9683764" cy="4727740"/>
           </a:xfrm>
           <a:prstGeom prst="rect">
             <a:avLst/>
@@ -10350,7 +10558,7 @@
           <a:p>
             <a:fld id="{A6A55E55-235A-4F68-B44B-5B270E39D9BB}" type="datetime1">
               <a:rPr lang="de-AT" smtClean="0"/>
-              <a:t>21.01.2018</a:t>
+              <a:t>22.01.2018</a:t>
             </a:fld>
             <a:endParaRPr lang="de-AT" dirty="0"/>
           </a:p>
@@ -10506,7 +10714,7 @@
           <a:p>
             <a:fld id="{A6A55E55-235A-4F68-B44B-5B270E39D9BB}" type="datetime1">
               <a:rPr lang="de-AT" smtClean="0"/>
-              <a:t>21.01.2018</a:t>
+              <a:t>22.01.2018</a:t>
             </a:fld>
             <a:endParaRPr lang="de-AT" dirty="0"/>
           </a:p>
@@ -10885,7 +11093,7 @@
           <a:p>
             <a:fld id="{A6A55E55-235A-4F68-B44B-5B270E39D9BB}" type="datetime1">
               <a:rPr lang="de-AT" smtClean="0"/>
-              <a:t>21.01.2018</a:t>
+              <a:t>22.01.2018</a:t>
             </a:fld>
             <a:endParaRPr lang="de-AT" dirty="0"/>
           </a:p>
@@ -11423,7 +11631,7 @@
           <a:p>
             <a:fld id="{A6A55E55-235A-4F68-B44B-5B270E39D9BB}" type="datetime1">
               <a:rPr lang="de-AT" smtClean="0"/>
-              <a:t>21.01.2018</a:t>
+              <a:t>22.01.2018</a:t>
             </a:fld>
             <a:endParaRPr lang="de-AT" dirty="0"/>
           </a:p>

</xml_diff>

<commit_message>
Meinen Teil ins Handout eingepflegt und minimal angepasst, Rechtschreibfehler in ppt korrigiert
</commit_message>
<xml_diff>
--- a/01_Projektmanagement/Assignment 5 - Project Managements Methods.pptx
+++ b/01_Projektmanagement/Assignment 5 - Project Managements Methods.pptx
@@ -174,16 +174,110 @@
 </p:presentation>
 </file>
 
-<file path=ppt/revisionInfo.xml><?xml version="1.0" encoding="utf-8"?>
-<p1510:revInfo xmlns:a="http://schemas.openxmlformats.org/drawingml/2006/main" xmlns:r="http://schemas.openxmlformats.org/officeDocument/2006/relationships" xmlns:p1510="http://schemas.microsoft.com/office/powerpoint/2015/10/main"/>
-</file>
-
 <file path=ppt/changesInfos/changesInfo1.xml><?xml version="1.0" encoding="utf-8"?>
 <pc:chgInfo xmlns:a="http://schemas.openxmlformats.org/drawingml/2006/main" xmlns:r="http://schemas.openxmlformats.org/officeDocument/2006/relationships" xmlns:ac="http://schemas.microsoft.com/office/drawing/2013/main/command" xmlns:pc="http://schemas.microsoft.com/office/powerpoint/2013/main/command">
   <pc:docChgLst>
+    <pc:chgData name="Chris G" userId="ec6dd0bf820af39d" providerId="LiveId" clId="{77B084DB-34BD-4714-AFF6-B98C98F6D19D}"/>
+    <pc:docChg chg="custSel addSld delSld modSld modMainMaster">
+      <pc:chgData name="Chris G" userId="ec6dd0bf820af39d" providerId="LiveId" clId="{77B084DB-34BD-4714-AFF6-B98C98F6D19D}" dt="2018-01-19T18:41:39.476" v="445" actId="20577"/>
+      <pc:docMkLst>
+        <pc:docMk/>
+      </pc:docMkLst>
+      <pc:sldChg chg="modSp">
+        <pc:chgData name="Chris G" userId="ec6dd0bf820af39d" providerId="LiveId" clId="{77B084DB-34BD-4714-AFF6-B98C98F6D19D}" dt="2018-01-19T18:41:39.476" v="445" actId="20577"/>
+        <pc:sldMkLst>
+          <pc:docMk/>
+          <pc:sldMk cId="1175140175" sldId="1735"/>
+        </pc:sldMkLst>
+        <pc:spChg chg="mod">
+          <ac:chgData name="Chris G" userId="ec6dd0bf820af39d" providerId="LiveId" clId="{77B084DB-34BD-4714-AFF6-B98C98F6D19D}" dt="2018-01-19T18:41:39.476" v="445" actId="20577"/>
+          <ac:spMkLst>
+            <pc:docMk/>
+            <pc:sldMk cId="1175140175" sldId="1735"/>
+            <ac:spMk id="2" creationId="{00000000-0000-0000-0000-000000000000}"/>
+          </ac:spMkLst>
+        </pc:spChg>
+      </pc:sldChg>
+      <pc:sldChg chg="modSp add">
+        <pc:chgData name="Chris G" userId="ec6dd0bf820af39d" providerId="LiveId" clId="{77B084DB-34BD-4714-AFF6-B98C98F6D19D}" dt="2018-01-19T18:41:02.716" v="422" actId="27636"/>
+        <pc:sldMkLst>
+          <pc:docMk/>
+          <pc:sldMk cId="2335807216" sldId="1740"/>
+        </pc:sldMkLst>
+        <pc:spChg chg="mod">
+          <ac:chgData name="Chris G" userId="ec6dd0bf820af39d" providerId="LiveId" clId="{77B084DB-34BD-4714-AFF6-B98C98F6D19D}" dt="2018-01-19T18:41:02.716" v="422" actId="27636"/>
+          <ac:spMkLst>
+            <pc:docMk/>
+            <pc:sldMk cId="2335807216" sldId="1740"/>
+            <ac:spMk id="3" creationId="{EEB99570-74B8-496E-9BF0-78D33340D20E}"/>
+          </ac:spMkLst>
+        </pc:spChg>
+      </pc:sldChg>
+      <pc:sldMasterChg chg="modSldLayout">
+        <pc:chgData name="Chris G" userId="ec6dd0bf820af39d" providerId="LiveId" clId="{77B084DB-34BD-4714-AFF6-B98C98F6D19D}" dt="2018-01-19T18:39:27.761" v="397" actId="20577"/>
+        <pc:sldMasterMkLst>
+          <pc:docMk/>
+          <pc:sldMasterMk cId="1056324580" sldId="2147483648"/>
+        </pc:sldMasterMkLst>
+        <pc:sldLayoutChg chg="modSp">
+          <pc:chgData name="Chris G" userId="ec6dd0bf820af39d" providerId="LiveId" clId="{77B084DB-34BD-4714-AFF6-B98C98F6D19D}" dt="2018-01-19T18:39:27.761" v="397" actId="20577"/>
+          <pc:sldLayoutMkLst>
+            <pc:docMk/>
+            <pc:sldMasterMk cId="1056324580" sldId="2147483648"/>
+            <pc:sldLayoutMk cId="2118820008" sldId="2147483650"/>
+          </pc:sldLayoutMkLst>
+          <pc:spChg chg="mod">
+            <ac:chgData name="Chris G" userId="ec6dd0bf820af39d" providerId="LiveId" clId="{77B084DB-34BD-4714-AFF6-B98C98F6D19D}" dt="2018-01-19T18:19:44.033" v="85" actId="20577"/>
+            <ac:spMkLst>
+              <pc:docMk/>
+              <pc:sldMasterMk cId="1056324580" sldId="2147483648"/>
+              <pc:sldLayoutMk cId="2118820008" sldId="2147483650"/>
+              <ac:spMk id="3" creationId="{00000000-0000-0000-0000-000000000000}"/>
+            </ac:spMkLst>
+          </pc:spChg>
+          <pc:spChg chg="mod">
+            <ac:chgData name="Chris G" userId="ec6dd0bf820af39d" providerId="LiveId" clId="{77B084DB-34BD-4714-AFF6-B98C98F6D19D}" dt="2018-01-19T18:39:27.761" v="397" actId="20577"/>
+            <ac:spMkLst>
+              <pc:docMk/>
+              <pc:sldMasterMk cId="1056324580" sldId="2147483648"/>
+              <pc:sldLayoutMk cId="2118820008" sldId="2147483650"/>
+              <ac:spMk id="9" creationId="{00000000-0000-0000-0000-000000000000}"/>
+            </ac:spMkLst>
+          </pc:spChg>
+        </pc:sldLayoutChg>
+        <pc:sldLayoutChg chg="modSp">
+          <pc:chgData name="Chris G" userId="ec6dd0bf820af39d" providerId="LiveId" clId="{77B084DB-34BD-4714-AFF6-B98C98F6D19D}" dt="2018-01-19T18:20:06.082" v="100" actId="20577"/>
+          <pc:sldLayoutMkLst>
+            <pc:docMk/>
+            <pc:sldMasterMk cId="1056324580" sldId="2147483648"/>
+            <pc:sldLayoutMk cId="2665502471" sldId="2147483653"/>
+          </pc:sldLayoutMkLst>
+          <pc:spChg chg="mod">
+            <ac:chgData name="Chris G" userId="ec6dd0bf820af39d" providerId="LiveId" clId="{77B084DB-34BD-4714-AFF6-B98C98F6D19D}" dt="2018-01-19T18:20:04.658" v="99" actId="20577"/>
+            <ac:spMkLst>
+              <pc:docMk/>
+              <pc:sldMasterMk cId="1056324580" sldId="2147483648"/>
+              <pc:sldLayoutMk cId="2665502471" sldId="2147483653"/>
+              <ac:spMk id="4" creationId="{00000000-0000-0000-0000-000000000000}"/>
+            </ac:spMkLst>
+          </pc:spChg>
+          <pc:spChg chg="mod">
+            <ac:chgData name="Chris G" userId="ec6dd0bf820af39d" providerId="LiveId" clId="{77B084DB-34BD-4714-AFF6-B98C98F6D19D}" dt="2018-01-19T18:20:06.082" v="100" actId="20577"/>
+            <ac:spMkLst>
+              <pc:docMk/>
+              <pc:sldMasterMk cId="1056324580" sldId="2147483648"/>
+              <pc:sldLayoutMk cId="2665502471" sldId="2147483653"/>
+              <ac:spMk id="6" creationId="{00000000-0000-0000-0000-000000000000}"/>
+            </ac:spMkLst>
+          </pc:spChg>
+        </pc:sldLayoutChg>
+      </pc:sldMasterChg>
+    </pc:docChg>
+  </pc:docChgLst>
+  <pc:docChgLst>
     <pc:chgData name="Chris G" userId="ec6dd0bf820af39d" providerId="LiveId" clId="{A6C1FA34-9980-42BD-90CE-52D17F13C601}"/>
     <pc:docChg chg="undo redo custSel addSld delSld modSld">
-      <pc:chgData name="Chris G" userId="ec6dd0bf820af39d" providerId="LiveId" clId="{A6C1FA34-9980-42BD-90CE-52D17F13C601}" dt="2018-01-21T19:40:09.843" v="1833"/>
+      <pc:chgData name="Chris G" userId="ec6dd0bf820af39d" providerId="LiveId" clId="{A6C1FA34-9980-42BD-90CE-52D17F13C601}" dt="2018-01-22T20:00:40.600" v="1880"/>
       <pc:docMkLst>
         <pc:docMk/>
       </pc:docMkLst>
@@ -195,13 +289,13 @@
         </pc:sldMkLst>
       </pc:sldChg>
       <pc:sldChg chg="modSp">
-        <pc:chgData name="Chris G" userId="ec6dd0bf820af39d" providerId="LiveId" clId="{A6C1FA34-9980-42BD-90CE-52D17F13C601}" dt="2018-01-21T18:51:32.939" v="891"/>
+        <pc:chgData name="Chris G" userId="ec6dd0bf820af39d" providerId="LiveId" clId="{A6C1FA34-9980-42BD-90CE-52D17F13C601}" dt="2018-01-22T18:54:03.176" v="1835" actId="20577"/>
         <pc:sldMkLst>
           <pc:docMk/>
           <pc:sldMk cId="1175140175" sldId="1735"/>
         </pc:sldMkLst>
         <pc:spChg chg="mod">
-          <ac:chgData name="Chris G" userId="ec6dd0bf820af39d" providerId="LiveId" clId="{A6C1FA34-9980-42BD-90CE-52D17F13C601}" dt="2018-01-21T18:51:32.939" v="891"/>
+          <ac:chgData name="Chris G" userId="ec6dd0bf820af39d" providerId="LiveId" clId="{A6C1FA34-9980-42BD-90CE-52D17F13C601}" dt="2018-01-22T18:54:03.176" v="1835" actId="20577"/>
           <ac:spMkLst>
             <pc:docMk/>
             <pc:sldMk cId="1175140175" sldId="1735"/>
@@ -238,7 +332,7 @@
         </pc:sldMkLst>
       </pc:sldChg>
       <pc:sldChg chg="addSp delSp modSp modAnim modNotesTx">
-        <pc:chgData name="Chris G" userId="ec6dd0bf820af39d" providerId="LiveId" clId="{A6C1FA34-9980-42BD-90CE-52D17F13C601}" dt="2018-01-21T19:39:59.500" v="1830"/>
+        <pc:chgData name="Chris G" userId="ec6dd0bf820af39d" providerId="LiveId" clId="{A6C1FA34-9980-42BD-90CE-52D17F13C601}" dt="2018-01-22T19:52:14.090" v="1874" actId="20577"/>
         <pc:sldMkLst>
           <pc:docMk/>
           <pc:sldMk cId="2335807216" sldId="1740"/>
@@ -252,7 +346,7 @@
           </ac:spMkLst>
         </pc:spChg>
         <pc:spChg chg="mod">
-          <ac:chgData name="Chris G" userId="ec6dd0bf820af39d" providerId="LiveId" clId="{A6C1FA34-9980-42BD-90CE-52D17F13C601}" dt="2018-01-21T19:39:59.500" v="1830"/>
+          <ac:chgData name="Chris G" userId="ec6dd0bf820af39d" providerId="LiveId" clId="{A6C1FA34-9980-42BD-90CE-52D17F13C601}" dt="2018-01-22T19:52:14.090" v="1874" actId="20577"/>
           <ac:spMkLst>
             <pc:docMk/>
             <pc:sldMk cId="2335807216" sldId="1740"/>
@@ -300,7 +394,7 @@
           </ac:spMkLst>
         </pc:spChg>
         <pc:spChg chg="add mod">
-          <ac:chgData name="Chris G" userId="ec6dd0bf820af39d" providerId="LiveId" clId="{A6C1FA34-9980-42BD-90CE-52D17F13C601}" dt="2018-01-21T19:20:15.416" v="1204" actId="1076"/>
+          <ac:chgData name="Chris G" userId="ec6dd0bf820af39d" providerId="LiveId" clId="{A6C1FA34-9980-42BD-90CE-52D17F13C601}" dt="2018-01-22T19:20:07.853" v="1857" actId="20577"/>
           <ac:spMkLst>
             <pc:docMk/>
             <pc:sldMk cId="2335807216" sldId="1740"/>
@@ -308,7 +402,7 @@
           </ac:spMkLst>
         </pc:spChg>
         <pc:spChg chg="add mod">
-          <ac:chgData name="Chris G" userId="ec6dd0bf820af39d" providerId="LiveId" clId="{A6C1FA34-9980-42BD-90CE-52D17F13C601}" dt="2018-01-21T19:20:20.260" v="1205" actId="1076"/>
+          <ac:chgData name="Chris G" userId="ec6dd0bf820af39d" providerId="LiveId" clId="{A6C1FA34-9980-42BD-90CE-52D17F13C601}" dt="2018-01-22T19:23:20.421" v="1869" actId="20577"/>
           <ac:spMkLst>
             <pc:docMk/>
             <pc:sldMk cId="2335807216" sldId="1740"/>
@@ -324,7 +418,7 @@
           </ac:spMkLst>
         </pc:spChg>
         <pc:spChg chg="add mod">
-          <ac:chgData name="Chris G" userId="ec6dd0bf820af39d" providerId="LiveId" clId="{A6C1FA34-9980-42BD-90CE-52D17F13C601}" dt="2018-01-21T19:20:23.724" v="1206" actId="1076"/>
+          <ac:chgData name="Chris G" userId="ec6dd0bf820af39d" providerId="LiveId" clId="{A6C1FA34-9980-42BD-90CE-52D17F13C601}" dt="2018-01-22T19:26:11.085" v="1870" actId="20577"/>
           <ac:spMkLst>
             <pc:docMk/>
             <pc:sldMk cId="2335807216" sldId="1740"/>
@@ -381,7 +475,7 @@
         </pc:cxnChg>
       </pc:sldChg>
       <pc:sldChg chg="addSp delSp modSp add modAnim modNotesTx">
-        <pc:chgData name="Chris G" userId="ec6dd0bf820af39d" providerId="LiveId" clId="{A6C1FA34-9980-42BD-90CE-52D17F13C601}" dt="2018-01-21T19:40:03.061" v="1831"/>
+        <pc:chgData name="Chris G" userId="ec6dd0bf820af39d" providerId="LiveId" clId="{A6C1FA34-9980-42BD-90CE-52D17F13C601}" dt="2018-01-22T19:52:11.792" v="1873" actId="20577"/>
         <pc:sldMkLst>
           <pc:docMk/>
           <pc:sldMk cId="3866618705" sldId="1741"/>
@@ -395,7 +489,7 @@
           </ac:spMkLst>
         </pc:spChg>
         <pc:spChg chg="mod">
-          <ac:chgData name="Chris G" userId="ec6dd0bf820af39d" providerId="LiveId" clId="{A6C1FA34-9980-42BD-90CE-52D17F13C601}" dt="2018-01-21T19:40:03.061" v="1831"/>
+          <ac:chgData name="Chris G" userId="ec6dd0bf820af39d" providerId="LiveId" clId="{A6C1FA34-9980-42BD-90CE-52D17F13C601}" dt="2018-01-22T19:52:11.792" v="1873" actId="20577"/>
           <ac:spMkLst>
             <pc:docMk/>
             <pc:sldMk cId="3866618705" sldId="1741"/>
@@ -660,13 +754,13 @@
         </pc:cxnChg>
       </pc:sldChg>
       <pc:sldChg chg="addSp delSp modSp add modAnim">
-        <pc:chgData name="Chris G" userId="ec6dd0bf820af39d" providerId="LiveId" clId="{A6C1FA34-9980-42BD-90CE-52D17F13C601}" dt="2018-01-21T19:40:05.584" v="1832"/>
+        <pc:chgData name="Chris G" userId="ec6dd0bf820af39d" providerId="LiveId" clId="{A6C1FA34-9980-42BD-90CE-52D17F13C601}" dt="2018-01-22T19:52:28.280" v="1878" actId="20577"/>
         <pc:sldMkLst>
           <pc:docMk/>
           <pc:sldMk cId="3319509260" sldId="1742"/>
         </pc:sldMkLst>
         <pc:spChg chg="mod">
-          <ac:chgData name="Chris G" userId="ec6dd0bf820af39d" providerId="LiveId" clId="{A6C1FA34-9980-42BD-90CE-52D17F13C601}" dt="2018-01-21T19:37:43.641" v="1789" actId="20577"/>
+          <ac:chgData name="Chris G" userId="ec6dd0bf820af39d" providerId="LiveId" clId="{A6C1FA34-9980-42BD-90CE-52D17F13C601}" dt="2018-01-22T19:52:28.280" v="1878" actId="20577"/>
           <ac:spMkLst>
             <pc:docMk/>
             <pc:sldMk cId="3319509260" sldId="1742"/>
@@ -674,11 +768,19 @@
           </ac:spMkLst>
         </pc:spChg>
         <pc:spChg chg="mod">
-          <ac:chgData name="Chris G" userId="ec6dd0bf820af39d" providerId="LiveId" clId="{A6C1FA34-9980-42BD-90CE-52D17F13C601}" dt="2018-01-21T19:40:05.584" v="1832"/>
+          <ac:chgData name="Chris G" userId="ec6dd0bf820af39d" providerId="LiveId" clId="{A6C1FA34-9980-42BD-90CE-52D17F13C601}" dt="2018-01-22T19:52:09.087" v="1872" actId="20577"/>
           <ac:spMkLst>
             <pc:docMk/>
             <pc:sldMk cId="3319509260" sldId="1742"/>
             <ac:spMk id="3" creationId="{EEB99570-74B8-496E-9BF0-78D33340D20E}"/>
+          </ac:spMkLst>
+        </pc:spChg>
+        <pc:spChg chg="mod">
+          <ac:chgData name="Chris G" userId="ec6dd0bf820af39d" providerId="LiveId" clId="{A6C1FA34-9980-42BD-90CE-52D17F13C601}" dt="2018-01-22T18:54:24.159" v="1837" actId="1076"/>
+          <ac:spMkLst>
+            <pc:docMk/>
+            <pc:sldMk cId="3319509260" sldId="1742"/>
+            <ac:spMk id="5" creationId="{18141F45-EC25-4DB8-AC7F-15667D547142}"/>
           </ac:spMkLst>
         </pc:spChg>
         <pc:spChg chg="del">
@@ -698,7 +800,7 @@
           </ac:spMkLst>
         </pc:spChg>
         <pc:spChg chg="add mod">
-          <ac:chgData name="Chris G" userId="ec6dd0bf820af39d" providerId="LiveId" clId="{A6C1FA34-9980-42BD-90CE-52D17F13C601}" dt="2018-01-21T19:25:50.137" v="1304" actId="1076"/>
+          <ac:chgData name="Chris G" userId="ec6dd0bf820af39d" providerId="LiveId" clId="{A6C1FA34-9980-42BD-90CE-52D17F13C601}" dt="2018-01-22T18:54:52.440" v="1845"/>
           <ac:spMkLst>
             <pc:docMk/>
             <pc:sldMk cId="3319509260" sldId="1742"/>
@@ -851,11 +953,19 @@
         </pc:cxnChg>
       </pc:sldChg>
       <pc:sldChg chg="modSp add">
-        <pc:chgData name="Chris G" userId="ec6dd0bf820af39d" providerId="LiveId" clId="{A6C1FA34-9980-42BD-90CE-52D17F13C601}" dt="2018-01-21T19:39:08.486" v="1820"/>
+        <pc:chgData name="Chris G" userId="ec6dd0bf820af39d" providerId="LiveId" clId="{A6C1FA34-9980-42BD-90CE-52D17F13C601}" dt="2018-01-22T18:54:35.462" v="1844" actId="20577"/>
         <pc:sldMkLst>
           <pc:docMk/>
           <pc:sldMk cId="2739111897" sldId="1743"/>
         </pc:sldMkLst>
+        <pc:spChg chg="mod">
+          <ac:chgData name="Chris G" userId="ec6dd0bf820af39d" providerId="LiveId" clId="{A6C1FA34-9980-42BD-90CE-52D17F13C601}" dt="2018-01-22T18:54:35.462" v="1844" actId="20577"/>
+          <ac:spMkLst>
+            <pc:docMk/>
+            <pc:sldMk cId="2739111897" sldId="1743"/>
+            <ac:spMk id="2" creationId="{A0090D94-8488-4D9C-80B3-EF6C6566BF25}"/>
+          </ac:spMkLst>
+        </pc:spChg>
         <pc:spChg chg="mod">
           <ac:chgData name="Chris G" userId="ec6dd0bf820af39d" providerId="LiveId" clId="{A6C1FA34-9980-42BD-90CE-52D17F13C601}" dt="2018-01-21T19:39:08.486" v="1820"/>
           <ac:spMkLst>
@@ -897,7 +1007,7 @@
         </pc:spChg>
       </pc:sldChg>
       <pc:sldChg chg="addSp delSp modSp add">
-        <pc:chgData name="Chris G" userId="ec6dd0bf820af39d" providerId="LiveId" clId="{A6C1FA34-9980-42BD-90CE-52D17F13C601}" dt="2018-01-21T19:39:46.551" v="1826"/>
+        <pc:chgData name="Chris G" userId="ec6dd0bf820af39d" providerId="LiveId" clId="{A6C1FA34-9980-42BD-90CE-52D17F13C601}" dt="2018-01-22T18:55:23.765" v="1850" actId="14100"/>
         <pc:sldMkLst>
           <pc:docMk/>
           <pc:sldMk cId="3589922886" sldId="1745"/>
@@ -916,6 +1026,14 @@
             <pc:docMk/>
             <pc:sldMk cId="3589922886" sldId="1745"/>
             <ac:spMk id="3" creationId="{B918CDB5-839F-4765-81B8-5D9AB3526412}"/>
+          </ac:spMkLst>
+        </pc:spChg>
+        <pc:spChg chg="mod">
+          <ac:chgData name="Chris G" userId="ec6dd0bf820af39d" providerId="LiveId" clId="{A6C1FA34-9980-42BD-90CE-52D17F13C601}" dt="2018-01-22T18:55:23.765" v="1850" actId="14100"/>
+          <ac:spMkLst>
+            <pc:docMk/>
+            <pc:sldMk cId="3589922886" sldId="1745"/>
+            <ac:spMk id="8" creationId="{8E794ECD-7DC9-4AED-BF12-C6623322CAC4}"/>
           </ac:spMkLst>
         </pc:spChg>
         <pc:spChg chg="add del">
@@ -988,7 +1106,7 @@
         </pc:sldMkLst>
       </pc:sldChg>
       <pc:sldChg chg="addSp delSp modSp add delAnim modAnim">
-        <pc:chgData name="Chris G" userId="ec6dd0bf820af39d" providerId="LiveId" clId="{A6C1FA34-9980-42BD-90CE-52D17F13C601}" dt="2018-01-21T19:40:09.843" v="1833"/>
+        <pc:chgData name="Chris G" userId="ec6dd0bf820af39d" providerId="LiveId" clId="{A6C1FA34-9980-42BD-90CE-52D17F13C601}" dt="2018-01-22T20:00:40.600" v="1880"/>
         <pc:sldMkLst>
           <pc:docMk/>
           <pc:sldMk cId="3662040572" sldId="1749"/>
@@ -1002,7 +1120,7 @@
           </ac:spMkLst>
         </pc:spChg>
         <pc:spChg chg="mod">
-          <ac:chgData name="Chris G" userId="ec6dd0bf820af39d" providerId="LiveId" clId="{A6C1FA34-9980-42BD-90CE-52D17F13C601}" dt="2018-01-21T19:40:09.843" v="1833"/>
+          <ac:chgData name="Chris G" userId="ec6dd0bf820af39d" providerId="LiveId" clId="{A6C1FA34-9980-42BD-90CE-52D17F13C601}" dt="2018-01-22T19:52:16.745" v="1875" actId="20577"/>
           <ac:spMkLst>
             <pc:docMk/>
             <pc:sldMk cId="3662040572" sldId="1749"/>
@@ -1034,7 +1152,7 @@
           </ac:spMkLst>
         </pc:spChg>
         <pc:spChg chg="add mod">
-          <ac:chgData name="Chris G" userId="ec6dd0bf820af39d" providerId="LiveId" clId="{A6C1FA34-9980-42BD-90CE-52D17F13C601}" dt="2018-01-21T19:35:24.742" v="1759" actId="1076"/>
+          <ac:chgData name="Chris G" userId="ec6dd0bf820af39d" providerId="LiveId" clId="{A6C1FA34-9980-42BD-90CE-52D17F13C601}" dt="2018-01-22T19:00:38.434" v="1851" actId="20577"/>
           <ac:spMkLst>
             <pc:docMk/>
             <pc:sldMk cId="3662040572" sldId="1749"/>
@@ -1074,7 +1192,7 @@
           </ac:spMkLst>
         </pc:spChg>
         <pc:graphicFrameChg chg="add mod modGraphic">
-          <ac:chgData name="Chris G" userId="ec6dd0bf820af39d" providerId="LiveId" clId="{A6C1FA34-9980-42BD-90CE-52D17F13C601}" dt="2018-01-21T19:34:25.478" v="1717" actId="20577"/>
+          <ac:chgData name="Chris G" userId="ec6dd0bf820af39d" providerId="LiveId" clId="{A6C1FA34-9980-42BD-90CE-52D17F13C601}" dt="2018-01-22T19:52:19.139" v="1876" actId="20577"/>
           <ac:graphicFrameMkLst>
             <pc:docMk/>
             <pc:sldMk cId="3662040572" sldId="1749"/>
@@ -1097,6 +1215,14 @@
             <ac:picMk id="11" creationId="{1DA4BE89-9A65-4AB2-9A2C-FAA2953DDBBD}"/>
           </ac:picMkLst>
         </pc:picChg>
+        <pc:picChg chg="add del">
+          <ac:chgData name="Chris G" userId="ec6dd0bf820af39d" providerId="LiveId" clId="{A6C1FA34-9980-42BD-90CE-52D17F13C601}" dt="2018-01-22T20:00:40.600" v="1880"/>
+          <ac:picMkLst>
+            <pc:docMk/>
+            <pc:sldMk cId="3662040572" sldId="1749"/>
+            <ac:picMk id="15" creationId="{C3665CB4-6180-45B5-B745-1AA0B4064910}"/>
+          </ac:picMkLst>
+        </pc:picChg>
         <pc:picChg chg="add mod">
           <ac:chgData name="Chris G" userId="ec6dd0bf820af39d" providerId="LiveId" clId="{A6C1FA34-9980-42BD-90CE-52D17F13C601}" dt="2018-01-21T19:36:39.199" v="1768" actId="1076"/>
           <ac:picMkLst>
@@ -1106,104 +1232,6 @@
           </ac:picMkLst>
         </pc:picChg>
       </pc:sldChg>
-    </pc:docChg>
-  </pc:docChgLst>
-  <pc:docChgLst>
-    <pc:chgData name="Chris G" userId="ec6dd0bf820af39d" providerId="LiveId" clId="{77B084DB-34BD-4714-AFF6-B98C98F6D19D}"/>
-    <pc:docChg chg="custSel addSld delSld modSld modMainMaster">
-      <pc:chgData name="Chris G" userId="ec6dd0bf820af39d" providerId="LiveId" clId="{77B084DB-34BD-4714-AFF6-B98C98F6D19D}" dt="2018-01-19T18:41:39.476" v="445" actId="20577"/>
-      <pc:docMkLst>
-        <pc:docMk/>
-      </pc:docMkLst>
-      <pc:sldChg chg="modSp">
-        <pc:chgData name="Chris G" userId="ec6dd0bf820af39d" providerId="LiveId" clId="{77B084DB-34BD-4714-AFF6-B98C98F6D19D}" dt="2018-01-19T18:41:39.476" v="445" actId="20577"/>
-        <pc:sldMkLst>
-          <pc:docMk/>
-          <pc:sldMk cId="1175140175" sldId="1735"/>
-        </pc:sldMkLst>
-        <pc:spChg chg="mod">
-          <ac:chgData name="Chris G" userId="ec6dd0bf820af39d" providerId="LiveId" clId="{77B084DB-34BD-4714-AFF6-B98C98F6D19D}" dt="2018-01-19T18:41:39.476" v="445" actId="20577"/>
-          <ac:spMkLst>
-            <pc:docMk/>
-            <pc:sldMk cId="1175140175" sldId="1735"/>
-            <ac:spMk id="2" creationId="{00000000-0000-0000-0000-000000000000}"/>
-          </ac:spMkLst>
-        </pc:spChg>
-      </pc:sldChg>
-      <pc:sldChg chg="modSp add">
-        <pc:chgData name="Chris G" userId="ec6dd0bf820af39d" providerId="LiveId" clId="{77B084DB-34BD-4714-AFF6-B98C98F6D19D}" dt="2018-01-19T18:41:02.716" v="422" actId="27636"/>
-        <pc:sldMkLst>
-          <pc:docMk/>
-          <pc:sldMk cId="2335807216" sldId="1740"/>
-        </pc:sldMkLst>
-        <pc:spChg chg="mod">
-          <ac:chgData name="Chris G" userId="ec6dd0bf820af39d" providerId="LiveId" clId="{77B084DB-34BD-4714-AFF6-B98C98F6D19D}" dt="2018-01-19T18:41:02.716" v="422" actId="27636"/>
-          <ac:spMkLst>
-            <pc:docMk/>
-            <pc:sldMk cId="2335807216" sldId="1740"/>
-            <ac:spMk id="3" creationId="{EEB99570-74B8-496E-9BF0-78D33340D20E}"/>
-          </ac:spMkLst>
-        </pc:spChg>
-      </pc:sldChg>
-      <pc:sldMasterChg chg="modSldLayout">
-        <pc:chgData name="Chris G" userId="ec6dd0bf820af39d" providerId="LiveId" clId="{77B084DB-34BD-4714-AFF6-B98C98F6D19D}" dt="2018-01-19T18:39:27.761" v="397" actId="20577"/>
-        <pc:sldMasterMkLst>
-          <pc:docMk/>
-          <pc:sldMasterMk cId="1056324580" sldId="2147483648"/>
-        </pc:sldMasterMkLst>
-        <pc:sldLayoutChg chg="modSp">
-          <pc:chgData name="Chris G" userId="ec6dd0bf820af39d" providerId="LiveId" clId="{77B084DB-34BD-4714-AFF6-B98C98F6D19D}" dt="2018-01-19T18:39:27.761" v="397" actId="20577"/>
-          <pc:sldLayoutMkLst>
-            <pc:docMk/>
-            <pc:sldMasterMk cId="1056324580" sldId="2147483648"/>
-            <pc:sldLayoutMk cId="2118820008" sldId="2147483650"/>
-          </pc:sldLayoutMkLst>
-          <pc:spChg chg="mod">
-            <ac:chgData name="Chris G" userId="ec6dd0bf820af39d" providerId="LiveId" clId="{77B084DB-34BD-4714-AFF6-B98C98F6D19D}" dt="2018-01-19T18:19:44.033" v="85" actId="20577"/>
-            <ac:spMkLst>
-              <pc:docMk/>
-              <pc:sldMasterMk cId="1056324580" sldId="2147483648"/>
-              <pc:sldLayoutMk cId="2118820008" sldId="2147483650"/>
-              <ac:spMk id="3" creationId="{00000000-0000-0000-0000-000000000000}"/>
-            </ac:spMkLst>
-          </pc:spChg>
-          <pc:spChg chg="mod">
-            <ac:chgData name="Chris G" userId="ec6dd0bf820af39d" providerId="LiveId" clId="{77B084DB-34BD-4714-AFF6-B98C98F6D19D}" dt="2018-01-19T18:39:27.761" v="397" actId="20577"/>
-            <ac:spMkLst>
-              <pc:docMk/>
-              <pc:sldMasterMk cId="1056324580" sldId="2147483648"/>
-              <pc:sldLayoutMk cId="2118820008" sldId="2147483650"/>
-              <ac:spMk id="9" creationId="{00000000-0000-0000-0000-000000000000}"/>
-            </ac:spMkLst>
-          </pc:spChg>
-        </pc:sldLayoutChg>
-        <pc:sldLayoutChg chg="modSp">
-          <pc:chgData name="Chris G" userId="ec6dd0bf820af39d" providerId="LiveId" clId="{77B084DB-34BD-4714-AFF6-B98C98F6D19D}" dt="2018-01-19T18:20:06.082" v="100" actId="20577"/>
-          <pc:sldLayoutMkLst>
-            <pc:docMk/>
-            <pc:sldMasterMk cId="1056324580" sldId="2147483648"/>
-            <pc:sldLayoutMk cId="2665502471" sldId="2147483653"/>
-          </pc:sldLayoutMkLst>
-          <pc:spChg chg="mod">
-            <ac:chgData name="Chris G" userId="ec6dd0bf820af39d" providerId="LiveId" clId="{77B084DB-34BD-4714-AFF6-B98C98F6D19D}" dt="2018-01-19T18:20:04.658" v="99" actId="20577"/>
-            <ac:spMkLst>
-              <pc:docMk/>
-              <pc:sldMasterMk cId="1056324580" sldId="2147483648"/>
-              <pc:sldLayoutMk cId="2665502471" sldId="2147483653"/>
-              <ac:spMk id="4" creationId="{00000000-0000-0000-0000-000000000000}"/>
-            </ac:spMkLst>
-          </pc:spChg>
-          <pc:spChg chg="mod">
-            <ac:chgData name="Chris G" userId="ec6dd0bf820af39d" providerId="LiveId" clId="{77B084DB-34BD-4714-AFF6-B98C98F6D19D}" dt="2018-01-19T18:20:06.082" v="100" actId="20577"/>
-            <ac:spMkLst>
-              <pc:docMk/>
-              <pc:sldMasterMk cId="1056324580" sldId="2147483648"/>
-              <pc:sldLayoutMk cId="2665502471" sldId="2147483653"/>
-              <ac:spMk id="6" creationId="{00000000-0000-0000-0000-000000000000}"/>
-            </ac:spMkLst>
-          </pc:spChg>
-        </pc:sldLayoutChg>
-      </pc:sldMasterChg>
     </pc:docChg>
   </pc:docChgLst>
 </pc:chgInfo>
@@ -5651,7 +5679,7 @@
                   <a:schemeClr val="bg1"/>
                 </a:solidFill>
               </a:rPr>
-              <a:t>Traditional vs. Agil Methods</a:t>
+              <a:t>Traditional vs. Agile Methods</a:t>
             </a:r>
           </a:p>
         </p:txBody>
@@ -6951,7 +6979,7 @@
             </a:pPr>
             <a:r>
               <a:rPr lang="de-DE" dirty="0"/>
-              <a:t>Agil </a:t>
+              <a:t>Agile </a:t>
             </a:r>
             <a:r>
               <a:rPr lang="de-DE" dirty="0" err="1"/>
@@ -6976,11 +7004,11 @@
             </a:pPr>
             <a:r>
               <a:rPr lang="de-DE" dirty="0"/>
-              <a:t>	Agil </a:t>
+              <a:t>	Agile </a:t>
             </a:r>
             <a:r>
               <a:rPr lang="de-DE" dirty="0" err="1"/>
-              <a:t>developement</a:t>
+              <a:t>development</a:t>
             </a:r>
             <a:r>
               <a:rPr lang="de-DE" dirty="0"/>
@@ -7048,7 +7076,7 @@
                   <a:schemeClr val="bg1"/>
                 </a:solidFill>
               </a:rPr>
-              <a:t>Traditional vs. Agil Methods</a:t>
+              <a:t>Traditional vs. Agile Methods</a:t>
             </a:r>
           </a:p>
         </p:txBody>
@@ -7098,7 +7126,12 @@
             <p:ph type="ftr" sz="quarter" idx="11"/>
           </p:nvPr>
         </p:nvSpPr>
-        <p:spPr/>
+        <p:spPr>
+          <a:xfrm>
+            <a:off x="1712640" y="6356365"/>
+            <a:ext cx="4808810" cy="365125"/>
+          </a:xfrm>
+        </p:spPr>
         <p:txBody>
           <a:bodyPr/>
           <a:lstStyle/>
@@ -7716,17 +7749,7 @@
           <a:p>
             <a:r>
               <a:rPr lang="de-DE" sz="1000" dirty="0"/>
-              <a:t>Source:</a:t>
-            </a:r>
-            <a:r>
-              <a:rPr lang="de-DE" sz="1000" dirty="0">
-                <a:solidFill>
-                  <a:schemeClr val="bg1">
-                    <a:lumMod val="75000"/>
-                  </a:schemeClr>
-                </a:solidFill>
-              </a:rPr>
-              <a:t> https://www.visualstudio.com/de/learn/what-is-scrum/?rr=https%3A%2F%2Fwww.google.de%2F</a:t>
+              <a:t>Source: https://www.visualstudio.com/de/learn/what-is-scrum/?rr=https%3A%2F%2Fwww.google.de%2F</a:t>
             </a:r>
           </a:p>
         </p:txBody>
@@ -8068,7 +8091,7 @@
                   <a:schemeClr val="bg1"/>
                 </a:solidFill>
               </a:rPr>
-              <a:t>Traditional vs. Agil Methods</a:t>
+              <a:t>Traditional vs. Agile Methods</a:t>
             </a:r>
           </a:p>
         </p:txBody>
@@ -8175,7 +8198,7 @@
           <p:nvPr>
             <p:extLst>
               <p:ext uri="{D42A27DB-BD31-4B8C-83A1-F6EECF244321}">
-                <p14:modId xmlns:p14="http://schemas.microsoft.com/office/powerpoint/2010/main" val="817332842"/>
+                <p14:modId xmlns:p14="http://schemas.microsoft.com/office/powerpoint/2010/main" val="2388482745"/>
               </p:ext>
             </p:extLst>
           </p:nvPr>
@@ -8228,10 +8251,9 @@
                     <a:p>
                       <a:pPr algn="ctr"/>
                       <a:r>
-                        <a:rPr lang="en-GB" noProof="0" dirty="0" err="1"/>
-                        <a:t>Agil</a:t>
+                        <a:rPr lang="en-GB" noProof="0" dirty="0"/>
+                        <a:t>Agile</a:t>
                       </a:r>
-                      <a:endParaRPr lang="en-GB" noProof="0" dirty="0"/>
                     </a:p>
                   </a:txBody>
                   <a:tcPr anchor="ctr"/>
@@ -8508,10 +8530,9 @@
           <a:lstStyle/>
           <a:p>
             <a:r>
-              <a:rPr lang="de-DE" dirty="0" err="1"/>
-              <a:t>Developement</a:t>
-            </a:r>
-            <a:endParaRPr lang="de-DE" dirty="0"/>
+              <a:rPr lang="de-DE" dirty="0"/>
+              <a:t>Development</a:t>
+            </a:r>
           </a:p>
         </p:txBody>
       </p:sp>
@@ -8876,14 +8897,7 @@
             <a:pPr marL="0" indent="0">
               <a:buNone/>
             </a:pPr>
-            <a:r>
-              <a:rPr lang="de-AT" dirty="0">
-                <a:solidFill>
-                  <a:srgbClr val="FF0000"/>
-                </a:solidFill>
-              </a:rPr>
-              <a:t>HANDOUT NICHT VERGESSEN</a:t>
-            </a:r>
+            <a:endParaRPr lang="de-AT" dirty="0"/>
           </a:p>
           <a:p>
             <a:pPr marL="0" indent="0">
@@ -9309,10 +9323,9 @@
           <a:lstStyle/>
           <a:p>
             <a:r>
-              <a:rPr lang="de-AT"/>
+              <a:rPr lang="de-AT" dirty="0"/>
               <a:t>Project Management Methods - "Mars Expedition"</a:t>
             </a:r>
-            <a:endParaRPr lang="de-AT" dirty="0"/>
           </a:p>
         </p:txBody>
       </p:sp>
@@ -9456,8 +9469,8 @@
         </p:nvSpPr>
         <p:spPr>
           <a:xfrm>
-            <a:off x="1928664" y="6021288"/>
-            <a:ext cx="7103203" cy="307777"/>
+            <a:off x="3872880" y="6011005"/>
+            <a:ext cx="5158987" cy="246221"/>
           </a:xfrm>
           <a:prstGeom prst="rect">
             <a:avLst/>
@@ -9471,7 +9484,7 @@
           <a:lstStyle/>
           <a:p>
             <a:r>
-              <a:rPr lang="de-AT" sz="1400" dirty="0"/>
+              <a:rPr lang="de-AT" sz="1000" dirty="0"/>
               <a:t>Quelle: http://www.flensburger-budo-club.de/attachments/Image/team.jpg?template=generic</a:t>
             </a:r>
           </a:p>
@@ -9924,17 +9937,23 @@
           <a:prstGeom prst="rect">
             <a:avLst/>
           </a:prstGeom>
-          <a:noFill/>
         </p:spPr>
         <p:txBody>
-          <a:bodyPr wrap="square" rtlCol="0">
+          <a:bodyPr wrap="square">
             <a:spAutoFit/>
           </a:bodyPr>
-          <a:lstStyle/>
-          <a:p>
-            <a:r>
-              <a:rPr lang="de-AT" sz="1400" dirty="0"/>
-              <a:t>Quelle: http://www.mpmm.com/images/pmbok-processes.jpg</a:t>
+          <a:lstStyle>
+            <a:defPPr>
+              <a:defRPr lang="de-DE"/>
+            </a:defPPr>
+            <a:lvl1pPr>
+              <a:defRPr sz="1000"/>
+            </a:lvl1pPr>
+          </a:lstStyle>
+          <a:p>
+            <a:r>
+              <a:rPr lang="de-AT" dirty="0"/>
+              <a:t>Source: http://www.mpmm.com/images/pmbok-processes.jpg</a:t>
             </a:r>
           </a:p>
         </p:txBody>
@@ -11603,7 +11622,7 @@
                   <a:schemeClr val="bg1"/>
                 </a:solidFill>
               </a:rPr>
-              <a:t>Traditional vs. Agil Methods</a:t>
+              <a:t>Traditional vs. Agile Methods</a:t>
             </a:r>
           </a:p>
         </p:txBody>
@@ -12250,7 +12269,23 @@
                   <a:schemeClr val="tx1"/>
                 </a:solidFill>
               </a:rPr>
-              <a:t>Specificationlist</a:t>
+              <a:t>Specification</a:t>
+            </a:r>
+            <a:r>
+              <a:rPr lang="de-DE" sz="1600" dirty="0">
+                <a:solidFill>
+                  <a:schemeClr val="tx1"/>
+                </a:solidFill>
+              </a:rPr>
+              <a:t> </a:t>
+            </a:r>
+            <a:r>
+              <a:rPr lang="de-DE" sz="1600" dirty="0" err="1">
+                <a:solidFill>
+                  <a:schemeClr val="tx1"/>
+                </a:solidFill>
+              </a:rPr>
+              <a:t>list</a:t>
             </a:r>
             <a:endParaRPr lang="de-DE" sz="1600" dirty="0">
               <a:solidFill>
@@ -12264,12 +12299,20 @@
               <a:buChar char="•"/>
             </a:pPr>
             <a:r>
+              <a:rPr lang="de-DE" sz="1600" dirty="0">
+                <a:solidFill>
+                  <a:schemeClr val="tx1"/>
+                </a:solidFill>
+              </a:rPr>
+              <a:t>Risk </a:t>
+            </a:r>
+            <a:r>
               <a:rPr lang="de-DE" sz="1600" dirty="0" err="1">
                 <a:solidFill>
                   <a:schemeClr val="tx1"/>
                 </a:solidFill>
               </a:rPr>
-              <a:t>Riskanalyses</a:t>
+              <a:t>analysis</a:t>
             </a:r>
             <a:endParaRPr lang="de-DE" sz="1600" dirty="0">
               <a:solidFill>
@@ -12373,31 +12416,26 @@
               <a:buChar char="•"/>
             </a:pPr>
             <a:r>
+              <a:rPr lang="de-DE" sz="1600" dirty="0">
+                <a:solidFill>
+                  <a:schemeClr val="tx1"/>
+                </a:solidFill>
+              </a:rPr>
+              <a:t>Milestone plan</a:t>
+            </a:r>
+          </a:p>
+          <a:p>
+            <a:pPr marL="285750" indent="-285750">
+              <a:buFont typeface="Arial" panose="020B0604020202020204" pitchFamily="34" charset="0"/>
+              <a:buChar char="•"/>
+            </a:pPr>
+            <a:r>
               <a:rPr lang="de-DE" sz="1600" dirty="0" err="1">
                 <a:solidFill>
                   <a:schemeClr val="tx1"/>
                 </a:solidFill>
               </a:rPr>
-              <a:t>Milestoneplan</a:t>
-            </a:r>
-            <a:endParaRPr lang="de-DE" sz="1600" dirty="0">
-              <a:solidFill>
-                <a:schemeClr val="tx1"/>
-              </a:solidFill>
-            </a:endParaRPr>
-          </a:p>
-          <a:p>
-            <a:pPr marL="285750" indent="-285750">
-              <a:buFont typeface="Arial" panose="020B0604020202020204" pitchFamily="34" charset="0"/>
-              <a:buChar char="•"/>
-            </a:pPr>
-            <a:r>
-              <a:rPr lang="de-DE" sz="1600" dirty="0" err="1">
-                <a:solidFill>
-                  <a:schemeClr val="tx1"/>
-                </a:solidFill>
-              </a:rPr>
-              <a:t>Determining</a:t>
+              <a:t>Determine</a:t>
             </a:r>
             <a:r>
               <a:rPr lang="de-DE" sz="1600" dirty="0">
@@ -12448,7 +12486,23 @@
                   <a:schemeClr val="tx1"/>
                 </a:solidFill>
               </a:rPr>
-              <a:t>Workpackages</a:t>
+              <a:t>work</a:t>
+            </a:r>
+            <a:r>
+              <a:rPr lang="de-DE" sz="1600" dirty="0">
+                <a:solidFill>
+                  <a:schemeClr val="tx1"/>
+                </a:solidFill>
+              </a:rPr>
+              <a:t> </a:t>
+            </a:r>
+            <a:r>
+              <a:rPr lang="de-DE" sz="1600" dirty="0" err="1">
+                <a:solidFill>
+                  <a:schemeClr val="tx1"/>
+                </a:solidFill>
+              </a:rPr>
+              <a:t>packages</a:t>
             </a:r>
             <a:endParaRPr lang="de-DE" sz="1600" dirty="0">
               <a:solidFill>
@@ -12732,7 +12786,23 @@
                   <a:schemeClr val="tx1"/>
                 </a:solidFill>
               </a:rPr>
-              <a:t>projectplanning</a:t>
+              <a:t>project</a:t>
+            </a:r>
+            <a:r>
+              <a:rPr lang="de-DE" sz="1600" dirty="0">
+                <a:solidFill>
+                  <a:schemeClr val="tx1"/>
+                </a:solidFill>
+              </a:rPr>
+              <a:t> </a:t>
+            </a:r>
+            <a:r>
+              <a:rPr lang="de-DE" sz="1600" dirty="0" err="1">
+                <a:solidFill>
+                  <a:schemeClr val="tx1"/>
+                </a:solidFill>
+              </a:rPr>
+              <a:t>planning</a:t>
             </a:r>
             <a:endParaRPr lang="de-DE" sz="1600" dirty="0">
               <a:solidFill>

</xml_diff>